<commit_message>
Powerpoint de laatste versie!
</commit_message>
<xml_diff>
--- a/Lesroosters2.pptx
+++ b/Lesroosters2.pptx
@@ -5,18 +5,20 @@
     <p:sldMasterId id="2147483648" r:id="rId1"/>
   </p:sldMasterIdLst>
   <p:notesMasterIdLst>
-    <p:notesMasterId r:id="rId5"/>
+    <p:notesMasterId r:id="rId13"/>
   </p:notesMasterIdLst>
   <p:sldIdLst>
-    <p:sldId id="256" r:id="rId3"/>
-    <p:sldId id="257" r:id="rId4"/>
-    <p:sldId id="264" r:id="rId6"/>
-    <p:sldId id="258" r:id="rId7"/>
-    <p:sldId id="266" r:id="rId8"/>
-    <p:sldId id="262" r:id="rId9"/>
-    <p:sldId id="261" r:id="rId10"/>
-    <p:sldId id="259" r:id="rId11"/>
-    <p:sldId id="260" r:id="rId12"/>
+    <p:sldId id="256" r:id="rId2"/>
+    <p:sldId id="257" r:id="rId3"/>
+    <p:sldId id="264" r:id="rId4"/>
+    <p:sldId id="258" r:id="rId5"/>
+    <p:sldId id="266" r:id="rId6"/>
+    <p:sldId id="261" r:id="rId7"/>
+    <p:sldId id="262" r:id="rId8"/>
+    <p:sldId id="259" r:id="rId9"/>
+    <p:sldId id="260" r:id="rId10"/>
+    <p:sldId id="267" r:id="rId11"/>
+    <p:sldId id="269" r:id="rId12"/>
   </p:sldIdLst>
   <p:sldSz cx="9144000" cy="6858000" type="screen4x3"/>
   <p:notesSz cx="6858000" cy="9144000"/>
@@ -115,6 +117,22 @@
       </a:defRPr>
     </a:lvl9pPr>
   </p:defaultTextStyle>
+  <p:extLst>
+    <p:ext uri="{EFAFB233-063F-42B5-8137-9DF3F51BA10A}">
+      <p15:sldGuideLst xmlns:p15="http://schemas.microsoft.com/office/powerpoint/2012/main">
+        <p15:guide id="1" orient="horz">
+          <p15:clr>
+            <a:srgbClr val="A4A3A4"/>
+          </p15:clr>
+        </p15:guide>
+        <p15:guide id="2" pos="5736">
+          <p15:clr>
+            <a:srgbClr val="A4A3A4"/>
+          </p15:clr>
+        </p15:guide>
+      </p15:sldGuideLst>
+    </p:ext>
+  </p:extLst>
 </p:presentation>
 </file>
 
@@ -200,6 +218,7 @@
           <a:p>
             <a:fld id="{3EFD42F7-718C-4B98-AAEC-167E6DDD60A7}" type="datetimeFigureOut">
               <a:rPr lang="en-US" smtClean="0"/>
+              <a:t>5/4/2017</a:t>
             </a:fld>
             <a:endParaRPr lang="en-US"/>
           </a:p>
@@ -266,7 +285,6 @@
               <a:rPr lang="en-US" smtClean="0"/>
               <a:t>Click to edit Master text styles</a:t>
             </a:r>
-            <a:endParaRPr lang="en-US" smtClean="0"/>
           </a:p>
           <a:p>
             <a:pPr lvl="1"/>
@@ -274,7 +292,6 @@
               <a:rPr lang="en-US" smtClean="0"/>
               <a:t>Second level</a:t>
             </a:r>
-            <a:endParaRPr lang="en-US" smtClean="0"/>
           </a:p>
           <a:p>
             <a:pPr lvl="2"/>
@@ -282,7 +299,6 @@
               <a:rPr lang="en-US" smtClean="0"/>
               <a:t>Third level</a:t>
             </a:r>
-            <a:endParaRPr lang="en-US" smtClean="0"/>
           </a:p>
           <a:p>
             <a:pPr lvl="3"/>
@@ -290,7 +306,6 @@
               <a:rPr lang="en-US" smtClean="0"/>
               <a:t>Fourth level</a:t>
             </a:r>
-            <a:endParaRPr lang="en-US" smtClean="0"/>
           </a:p>
           <a:p>
             <a:pPr lvl="4"/>
@@ -362,12 +377,18 @@
           <a:p>
             <a:fld id="{21B2AA4F-B828-4D7C-AFD3-893933DAFCB4}" type="slidenum">
               <a:rPr lang="en-US" smtClean="0"/>
+              <a:t>‹nr.›</a:t>
             </a:fld>
             <a:endParaRPr lang="en-US"/>
           </a:p>
         </p:txBody>
       </p:sp>
     </p:spTree>
+    <p:extLst>
+      <p:ext uri="{BB962C8B-B14F-4D97-AF65-F5344CB8AC3E}">
+        <p14:creationId xmlns:p14="http://schemas.microsoft.com/office/powerpoint/2010/main" val="2557506104"/>
+      </p:ext>
+    </p:extLst>
   </p:cSld>
   <p:clrMap bg1="lt1" tx1="dk1" bg2="lt2" tx2="dk2" accent1="accent1" accent2="accent2" accent3="accent3" accent4="accent4" accent5="accent5" accent6="accent6" hlink="hlink" folHlink="folHlink"/>
   <p:notesStyle>
@@ -474,11 +495,20 @@
         <p:cNvGrpSpPr/>
         <p:nvPr/>
       </p:nvGrpSpPr>
-      <p:grpSpPr/>
+      <p:grpSpPr>
+        <a:xfrm>
+          <a:off x="0" y="0"/>
+          <a:ext cx="0" cy="0"/>
+          <a:chOff x="0" y="0"/>
+          <a:chExt cx="0" cy="0"/>
+        </a:xfrm>
+      </p:grpSpPr>
       <p:sp>
         <p:nvSpPr>
           <p:cNvPr id="2" name="Slide Image Placeholder 1"/>
-          <p:cNvSpPr/>
+          <p:cNvSpPr>
+            <a:spLocks noGrp="1" noRot="1" noChangeAspect="1"/>
+          </p:cNvSpPr>
           <p:nvPr>
             <p:ph type="sldImg" idx="2"/>
           </p:nvPr>
@@ -488,7 +518,9 @@
       <p:sp>
         <p:nvSpPr>
           <p:cNvPr id="3" name="Text Placeholder 2"/>
-          <p:cNvSpPr/>
+          <p:cNvSpPr>
+            <a:spLocks noGrp="1"/>
+          </p:cNvSpPr>
           <p:nvPr>
             <p:ph type="body" idx="3"/>
           </p:nvPr>
@@ -496,16 +528,21 @@
         <p:spPr/>
         <p:txBody>
           <a:bodyPr/>
+          <a:lstStyle/>
           <a:p>
             <a:r>
               <a:rPr lang="nl-NL" altLang="en-US"/>
               <a:t>Ik weet niet zeker of die 72 nog klopt. Als gaat kijken hoeveel dingen je daadwerkelijk hebt, dan is dat nu meer omdat we eerst niet het totaal aantal werkcolleges rekenden. </a:t>
             </a:r>
-            <a:endParaRPr lang="nl-NL" altLang="en-US"/>
           </a:p>
         </p:txBody>
       </p:sp>
     </p:spTree>
+    <p:extLst>
+      <p:ext uri="{BB962C8B-B14F-4D97-AF65-F5344CB8AC3E}">
+        <p14:creationId xmlns:p14="http://schemas.microsoft.com/office/powerpoint/2010/main" val="443543847"/>
+      </p:ext>
+    </p:extLst>
   </p:cSld>
   <p:clrMapOvr>
     <a:masterClrMapping/>
@@ -522,11 +559,20 @@
         <p:cNvGrpSpPr/>
         <p:nvPr/>
       </p:nvGrpSpPr>
-      <p:grpSpPr/>
+      <p:grpSpPr>
+        <a:xfrm>
+          <a:off x="0" y="0"/>
+          <a:ext cx="0" cy="0"/>
+          <a:chOff x="0" y="0"/>
+          <a:chExt cx="0" cy="0"/>
+        </a:xfrm>
+      </p:grpSpPr>
       <p:sp>
         <p:nvSpPr>
           <p:cNvPr id="2" name="Slide Image Placeholder 1"/>
-          <p:cNvSpPr/>
+          <p:cNvSpPr>
+            <a:spLocks noGrp="1" noRot="1" noChangeAspect="1"/>
+          </p:cNvSpPr>
           <p:nvPr>
             <p:ph type="sldImg" idx="2"/>
           </p:nvPr>
@@ -536,7 +582,9 @@
       <p:sp>
         <p:nvSpPr>
           <p:cNvPr id="3" name="Text Placeholder 2"/>
-          <p:cNvSpPr/>
+          <p:cNvSpPr>
+            <a:spLocks noGrp="1"/>
+          </p:cNvSpPr>
           <p:nvPr>
             <p:ph type="body" idx="3"/>
           </p:nvPr>
@@ -544,16 +592,21 @@
         <p:spPr/>
         <p:txBody>
           <a:bodyPr/>
+          <a:lstStyle/>
           <a:p>
             <a:r>
               <a:rPr lang="nl-NL" altLang="en-US"/>
               <a:t>Is deze slide nodig? Hij kan op zich wel weg, lijkt me.</a:t>
             </a:r>
-            <a:endParaRPr lang="nl-NL" altLang="en-US"/>
           </a:p>
         </p:txBody>
       </p:sp>
     </p:spTree>
+    <p:extLst>
+      <p:ext uri="{BB962C8B-B14F-4D97-AF65-F5344CB8AC3E}">
+        <p14:creationId xmlns:p14="http://schemas.microsoft.com/office/powerpoint/2010/main" val="1087958162"/>
+      </p:ext>
+    </p:extLst>
   </p:cSld>
   <p:clrMapOvr>
     <a:masterClrMapping/>
@@ -570,11 +623,20 @@
         <p:cNvGrpSpPr/>
         <p:nvPr/>
       </p:nvGrpSpPr>
-      <p:grpSpPr/>
+      <p:grpSpPr>
+        <a:xfrm>
+          <a:off x="0" y="0"/>
+          <a:ext cx="0" cy="0"/>
+          <a:chOff x="0" y="0"/>
+          <a:chExt cx="0" cy="0"/>
+        </a:xfrm>
+      </p:grpSpPr>
       <p:sp>
         <p:nvSpPr>
           <p:cNvPr id="2" name="Slide Image Placeholder 1"/>
-          <p:cNvSpPr/>
+          <p:cNvSpPr>
+            <a:spLocks noGrp="1" noRot="1" noChangeAspect="1"/>
+          </p:cNvSpPr>
           <p:nvPr>
             <p:ph type="sldImg" idx="2"/>
           </p:nvPr>
@@ -584,7 +646,9 @@
       <p:sp>
         <p:nvSpPr>
           <p:cNvPr id="3" name="Text Placeholder 2"/>
-          <p:cNvSpPr/>
+          <p:cNvSpPr>
+            <a:spLocks noGrp="1"/>
+          </p:cNvSpPr>
           <p:nvPr>
             <p:ph type="body" idx="3"/>
           </p:nvPr>
@@ -592,16 +656,21 @@
         <p:spPr/>
         <p:txBody>
           <a:bodyPr/>
+          <a:lstStyle/>
           <a:p>
             <a:r>
               <a:rPr lang="nl-NL" altLang="en-US"/>
               <a:t>Hier wat plaatjes die we kunnen toelichten. Die moeten we dan maken met SA op T0 = 0</a:t>
             </a:r>
-            <a:endParaRPr lang="nl-NL" altLang="en-US"/>
           </a:p>
         </p:txBody>
       </p:sp>
     </p:spTree>
+    <p:extLst>
+      <p:ext uri="{BB962C8B-B14F-4D97-AF65-F5344CB8AC3E}">
+        <p14:creationId xmlns:p14="http://schemas.microsoft.com/office/powerpoint/2010/main" val="2470559362"/>
+      </p:ext>
+    </p:extLst>
   </p:cSld>
   <p:clrMapOvr>
     <a:masterClrMapping/>
@@ -618,11 +687,20 @@
         <p:cNvGrpSpPr/>
         <p:nvPr/>
       </p:nvGrpSpPr>
-      <p:grpSpPr/>
+      <p:grpSpPr>
+        <a:xfrm>
+          <a:off x="0" y="0"/>
+          <a:ext cx="0" cy="0"/>
+          <a:chOff x="0" y="0"/>
+          <a:chExt cx="0" cy="0"/>
+        </a:xfrm>
+      </p:grpSpPr>
       <p:sp>
         <p:nvSpPr>
           <p:cNvPr id="2" name="Slide Image Placeholder 1"/>
-          <p:cNvSpPr/>
+          <p:cNvSpPr>
+            <a:spLocks noGrp="1" noRot="1" noChangeAspect="1"/>
+          </p:cNvSpPr>
           <p:nvPr>
             <p:ph type="sldImg" idx="2"/>
           </p:nvPr>
@@ -632,7 +710,9 @@
       <p:sp>
         <p:nvSpPr>
           <p:cNvPr id="3" name="Text Placeholder 2"/>
-          <p:cNvSpPr/>
+          <p:cNvSpPr>
+            <a:spLocks noGrp="1"/>
+          </p:cNvSpPr>
           <p:nvPr>
             <p:ph type="body" idx="3"/>
           </p:nvPr>
@@ -640,16 +720,85 @@
         <p:spPr/>
         <p:txBody>
           <a:bodyPr/>
+          <a:lstStyle/>
           <a:p>
             <a:r>
               <a:rPr lang="nl-NL" altLang="en-US"/>
               <a:t>Hier hetzelfde. </a:t>
             </a:r>
-            <a:endParaRPr lang="nl-NL" altLang="en-US"/>
           </a:p>
         </p:txBody>
       </p:sp>
     </p:spTree>
+    <p:extLst>
+      <p:ext uri="{BB962C8B-B14F-4D97-AF65-F5344CB8AC3E}">
+        <p14:creationId xmlns:p14="http://schemas.microsoft.com/office/powerpoint/2010/main" val="2629134137"/>
+      </p:ext>
+    </p:extLst>
+  </p:cSld>
+  <p:clrMapOvr>
+    <a:masterClrMapping/>
+  </p:clrMapOvr>
+</p:notes>
+</file>
+
+<file path=ppt/notesSlides/notesSlide5.xml><?xml version="1.0" encoding="utf-8"?>
+<p:notes xmlns:a="http://schemas.openxmlformats.org/drawingml/2006/main" xmlns:r="http://schemas.openxmlformats.org/officeDocument/2006/relationships" xmlns:p="http://schemas.openxmlformats.org/presentationml/2006/main">
+  <p:cSld>
+    <p:spTree>
+      <p:nvGrpSpPr>
+        <p:cNvPr id="1" name=""/>
+        <p:cNvGrpSpPr/>
+        <p:nvPr/>
+      </p:nvGrpSpPr>
+      <p:grpSpPr>
+        <a:xfrm>
+          <a:off x="0" y="0"/>
+          <a:ext cx="0" cy="0"/>
+          <a:chOff x="0" y="0"/>
+          <a:chExt cx="0" cy="0"/>
+        </a:xfrm>
+      </p:grpSpPr>
+      <p:sp>
+        <p:nvSpPr>
+          <p:cNvPr id="2" name="Slide Image Placeholder 1"/>
+          <p:cNvSpPr>
+            <a:spLocks noGrp="1" noRot="1" noChangeAspect="1"/>
+          </p:cNvSpPr>
+          <p:nvPr>
+            <p:ph type="sldImg" idx="2"/>
+          </p:nvPr>
+        </p:nvSpPr>
+        <p:spPr/>
+      </p:sp>
+      <p:sp>
+        <p:nvSpPr>
+          <p:cNvPr id="3" name="Text Placeholder 2"/>
+          <p:cNvSpPr>
+            <a:spLocks noGrp="1"/>
+          </p:cNvSpPr>
+          <p:nvPr>
+            <p:ph type="body" idx="3"/>
+          </p:nvPr>
+        </p:nvSpPr>
+        <p:spPr/>
+        <p:txBody>
+          <a:bodyPr/>
+          <a:lstStyle/>
+          <a:p>
+            <a:r>
+              <a:rPr lang="nl-NL" altLang="en-US" dirty="0"/>
+              <a:t>Hier hetzelfde. </a:t>
+            </a:r>
+          </a:p>
+        </p:txBody>
+      </p:sp>
+    </p:spTree>
+    <p:extLst>
+      <p:ext uri="{BB962C8B-B14F-4D97-AF65-F5344CB8AC3E}">
+        <p14:creationId xmlns:p14="http://schemas.microsoft.com/office/powerpoint/2010/main" val="1798164459"/>
+      </p:ext>
+    </p:extLst>
   </p:cSld>
   <p:clrMapOvr>
     <a:masterClrMapping/>
@@ -838,6 +987,7 @@
           <a:p>
             <a:fld id="{A2052887-A491-A045-BA09-FC89F2030B98}" type="datetimeFigureOut">
               <a:rPr lang="en-US" smtClean="0"/>
+              <a:t>5/4/2017</a:t>
             </a:fld>
             <a:endParaRPr lang="en-US"/>
           </a:p>
@@ -879,6 +1029,7 @@
           <a:p>
             <a:fld id="{8DF587FD-472B-5040-82FC-514079A450D3}" type="slidenum">
               <a:rPr lang="en-US" smtClean="0"/>
+              <a:t>‹nr.›</a:t>
             </a:fld>
             <a:endParaRPr lang="en-US"/>
           </a:p>
@@ -952,7 +1103,6 @@
               <a:rPr lang="nl-NL" smtClean="0"/>
               <a:t>Click to edit Master text styles</a:t>
             </a:r>
-            <a:endParaRPr lang="nl-NL" smtClean="0"/>
           </a:p>
           <a:p>
             <a:pPr lvl="1"/>
@@ -960,7 +1110,6 @@
               <a:rPr lang="nl-NL" smtClean="0"/>
               <a:t>Second level</a:t>
             </a:r>
-            <a:endParaRPr lang="nl-NL" smtClean="0"/>
           </a:p>
           <a:p>
             <a:pPr lvl="2"/>
@@ -968,7 +1117,6 @@
               <a:rPr lang="nl-NL" smtClean="0"/>
               <a:t>Third level</a:t>
             </a:r>
-            <a:endParaRPr lang="nl-NL" smtClean="0"/>
           </a:p>
           <a:p>
             <a:pPr lvl="3"/>
@@ -976,7 +1124,6 @@
               <a:rPr lang="nl-NL" smtClean="0"/>
               <a:t>Fourth level</a:t>
             </a:r>
-            <a:endParaRPr lang="nl-NL" smtClean="0"/>
           </a:p>
           <a:p>
             <a:pPr lvl="4"/>
@@ -1005,6 +1152,7 @@
           <a:p>
             <a:fld id="{A2052887-A491-A045-BA09-FC89F2030B98}" type="datetimeFigureOut">
               <a:rPr lang="en-US" smtClean="0"/>
+              <a:t>5/4/2017</a:t>
             </a:fld>
             <a:endParaRPr lang="en-US"/>
           </a:p>
@@ -1046,6 +1194,7 @@
           <a:p>
             <a:fld id="{8DF587FD-472B-5040-82FC-514079A450D3}" type="slidenum">
               <a:rPr lang="en-US" smtClean="0"/>
+              <a:t>‹nr.›</a:t>
             </a:fld>
             <a:endParaRPr lang="en-US"/>
           </a:p>
@@ -1129,7 +1278,6 @@
               <a:rPr lang="nl-NL" smtClean="0"/>
               <a:t>Click to edit Master text styles</a:t>
             </a:r>
-            <a:endParaRPr lang="nl-NL" smtClean="0"/>
           </a:p>
           <a:p>
             <a:pPr lvl="1"/>
@@ -1137,7 +1285,6 @@
               <a:rPr lang="nl-NL" smtClean="0"/>
               <a:t>Second level</a:t>
             </a:r>
-            <a:endParaRPr lang="nl-NL" smtClean="0"/>
           </a:p>
           <a:p>
             <a:pPr lvl="2"/>
@@ -1145,7 +1292,6 @@
               <a:rPr lang="nl-NL" smtClean="0"/>
               <a:t>Third level</a:t>
             </a:r>
-            <a:endParaRPr lang="nl-NL" smtClean="0"/>
           </a:p>
           <a:p>
             <a:pPr lvl="3"/>
@@ -1153,7 +1299,6 @@
               <a:rPr lang="nl-NL" smtClean="0"/>
               <a:t>Fourth level</a:t>
             </a:r>
-            <a:endParaRPr lang="nl-NL" smtClean="0"/>
           </a:p>
           <a:p>
             <a:pPr lvl="4"/>
@@ -1182,6 +1327,7 @@
           <a:p>
             <a:fld id="{A2052887-A491-A045-BA09-FC89F2030B98}" type="datetimeFigureOut">
               <a:rPr lang="en-US" smtClean="0"/>
+              <a:t>5/4/2017</a:t>
             </a:fld>
             <a:endParaRPr lang="en-US"/>
           </a:p>
@@ -1223,6 +1369,7 @@
           <a:p>
             <a:fld id="{8DF587FD-472B-5040-82FC-514079A450D3}" type="slidenum">
               <a:rPr lang="en-US" smtClean="0"/>
+              <a:t>‹nr.›</a:t>
             </a:fld>
             <a:endParaRPr lang="en-US"/>
           </a:p>
@@ -1296,7 +1443,6 @@
               <a:rPr lang="nl-NL" smtClean="0"/>
               <a:t>Click to edit Master text styles</a:t>
             </a:r>
-            <a:endParaRPr lang="nl-NL" smtClean="0"/>
           </a:p>
           <a:p>
             <a:pPr lvl="1"/>
@@ -1304,7 +1450,6 @@
               <a:rPr lang="nl-NL" smtClean="0"/>
               <a:t>Second level</a:t>
             </a:r>
-            <a:endParaRPr lang="nl-NL" smtClean="0"/>
           </a:p>
           <a:p>
             <a:pPr lvl="2"/>
@@ -1312,7 +1457,6 @@
               <a:rPr lang="nl-NL" smtClean="0"/>
               <a:t>Third level</a:t>
             </a:r>
-            <a:endParaRPr lang="nl-NL" smtClean="0"/>
           </a:p>
           <a:p>
             <a:pPr lvl="3"/>
@@ -1320,7 +1464,6 @@
               <a:rPr lang="nl-NL" smtClean="0"/>
               <a:t>Fourth level</a:t>
             </a:r>
-            <a:endParaRPr lang="nl-NL" smtClean="0"/>
           </a:p>
           <a:p>
             <a:pPr lvl="4"/>
@@ -1349,6 +1492,7 @@
           <a:p>
             <a:fld id="{A2052887-A491-A045-BA09-FC89F2030B98}" type="datetimeFigureOut">
               <a:rPr lang="en-US" smtClean="0"/>
+              <a:t>5/4/2017</a:t>
             </a:fld>
             <a:endParaRPr lang="en-US"/>
           </a:p>
@@ -1390,6 +1534,7 @@
           <a:p>
             <a:fld id="{8DF587FD-472B-5040-82FC-514079A450D3}" type="slidenum">
               <a:rPr lang="en-US" smtClean="0"/>
+              <a:t>‹nr.›</a:t>
             </a:fld>
             <a:endParaRPr lang="en-US"/>
           </a:p>
@@ -1568,7 +1713,6 @@
               <a:rPr lang="nl-NL" smtClean="0"/>
               <a:t>Click to edit Master text styles</a:t>
             </a:r>
-            <a:endParaRPr lang="nl-NL" smtClean="0"/>
           </a:p>
         </p:txBody>
       </p:sp>
@@ -1589,6 +1733,7 @@
           <a:p>
             <a:fld id="{A2052887-A491-A045-BA09-FC89F2030B98}" type="datetimeFigureOut">
               <a:rPr lang="en-US" smtClean="0"/>
+              <a:t>5/4/2017</a:t>
             </a:fld>
             <a:endParaRPr lang="en-US"/>
           </a:p>
@@ -1630,6 +1775,7 @@
           <a:p>
             <a:fld id="{8DF587FD-472B-5040-82FC-514079A450D3}" type="slidenum">
               <a:rPr lang="en-US" smtClean="0"/>
+              <a:t>‹nr.›</a:t>
             </a:fld>
             <a:endParaRPr lang="en-US"/>
           </a:p>
@@ -1736,7 +1882,6 @@
               <a:rPr lang="nl-NL" smtClean="0"/>
               <a:t>Click to edit Master text styles</a:t>
             </a:r>
-            <a:endParaRPr lang="nl-NL" smtClean="0"/>
           </a:p>
           <a:p>
             <a:pPr lvl="1"/>
@@ -1744,7 +1889,6 @@
               <a:rPr lang="nl-NL" smtClean="0"/>
               <a:t>Second level</a:t>
             </a:r>
-            <a:endParaRPr lang="nl-NL" smtClean="0"/>
           </a:p>
           <a:p>
             <a:pPr lvl="2"/>
@@ -1752,7 +1896,6 @@
               <a:rPr lang="nl-NL" smtClean="0"/>
               <a:t>Third level</a:t>
             </a:r>
-            <a:endParaRPr lang="nl-NL" smtClean="0"/>
           </a:p>
           <a:p>
             <a:pPr lvl="3"/>
@@ -1760,7 +1903,6 @@
               <a:rPr lang="nl-NL" smtClean="0"/>
               <a:t>Fourth level</a:t>
             </a:r>
-            <a:endParaRPr lang="nl-NL" smtClean="0"/>
           </a:p>
           <a:p>
             <a:pPr lvl="4"/>
@@ -1825,7 +1967,6 @@
               <a:rPr lang="nl-NL" smtClean="0"/>
               <a:t>Click to edit Master text styles</a:t>
             </a:r>
-            <a:endParaRPr lang="nl-NL" smtClean="0"/>
           </a:p>
           <a:p>
             <a:pPr lvl="1"/>
@@ -1833,7 +1974,6 @@
               <a:rPr lang="nl-NL" smtClean="0"/>
               <a:t>Second level</a:t>
             </a:r>
-            <a:endParaRPr lang="nl-NL" smtClean="0"/>
           </a:p>
           <a:p>
             <a:pPr lvl="2"/>
@@ -1841,7 +1981,6 @@
               <a:rPr lang="nl-NL" smtClean="0"/>
               <a:t>Third level</a:t>
             </a:r>
-            <a:endParaRPr lang="nl-NL" smtClean="0"/>
           </a:p>
           <a:p>
             <a:pPr lvl="3"/>
@@ -1849,7 +1988,6 @@
               <a:rPr lang="nl-NL" smtClean="0"/>
               <a:t>Fourth level</a:t>
             </a:r>
-            <a:endParaRPr lang="nl-NL" smtClean="0"/>
           </a:p>
           <a:p>
             <a:pPr lvl="4"/>
@@ -1878,6 +2016,7 @@
           <a:p>
             <a:fld id="{A2052887-A491-A045-BA09-FC89F2030B98}" type="datetimeFigureOut">
               <a:rPr lang="en-US" smtClean="0"/>
+              <a:t>5/4/2017</a:t>
             </a:fld>
             <a:endParaRPr lang="en-US"/>
           </a:p>
@@ -1919,6 +2058,7 @@
           <a:p>
             <a:fld id="{8DF587FD-472B-5040-82FC-514079A450D3}" type="slidenum">
               <a:rPr lang="en-US" smtClean="0"/>
+              <a:t>‹nr.›</a:t>
             </a:fld>
             <a:endParaRPr lang="en-US"/>
           </a:p>
@@ -2038,7 +2178,6 @@
               <a:rPr lang="nl-NL" smtClean="0"/>
               <a:t>Click to edit Master text styles</a:t>
             </a:r>
-            <a:endParaRPr lang="nl-NL" smtClean="0"/>
           </a:p>
         </p:txBody>
       </p:sp>
@@ -2095,7 +2234,6 @@
               <a:rPr lang="nl-NL" smtClean="0"/>
               <a:t>Click to edit Master text styles</a:t>
             </a:r>
-            <a:endParaRPr lang="nl-NL" smtClean="0"/>
           </a:p>
           <a:p>
             <a:pPr lvl="1"/>
@@ -2103,7 +2241,6 @@
               <a:rPr lang="nl-NL" smtClean="0"/>
               <a:t>Second level</a:t>
             </a:r>
-            <a:endParaRPr lang="nl-NL" smtClean="0"/>
           </a:p>
           <a:p>
             <a:pPr lvl="2"/>
@@ -2111,7 +2248,6 @@
               <a:rPr lang="nl-NL" smtClean="0"/>
               <a:t>Third level</a:t>
             </a:r>
-            <a:endParaRPr lang="nl-NL" smtClean="0"/>
           </a:p>
           <a:p>
             <a:pPr lvl="3"/>
@@ -2119,7 +2255,6 @@
               <a:rPr lang="nl-NL" smtClean="0"/>
               <a:t>Fourth level</a:t>
             </a:r>
-            <a:endParaRPr lang="nl-NL" smtClean="0"/>
           </a:p>
           <a:p>
             <a:pPr lvl="4"/>
@@ -2193,7 +2328,6 @@
               <a:rPr lang="nl-NL" smtClean="0"/>
               <a:t>Click to edit Master text styles</a:t>
             </a:r>
-            <a:endParaRPr lang="nl-NL" smtClean="0"/>
           </a:p>
         </p:txBody>
       </p:sp>
@@ -2250,7 +2384,6 @@
               <a:rPr lang="nl-NL" smtClean="0"/>
               <a:t>Click to edit Master text styles</a:t>
             </a:r>
-            <a:endParaRPr lang="nl-NL" smtClean="0"/>
           </a:p>
           <a:p>
             <a:pPr lvl="1"/>
@@ -2258,7 +2391,6 @@
               <a:rPr lang="nl-NL" smtClean="0"/>
               <a:t>Second level</a:t>
             </a:r>
-            <a:endParaRPr lang="nl-NL" smtClean="0"/>
           </a:p>
           <a:p>
             <a:pPr lvl="2"/>
@@ -2266,7 +2398,6 @@
               <a:rPr lang="nl-NL" smtClean="0"/>
               <a:t>Third level</a:t>
             </a:r>
-            <a:endParaRPr lang="nl-NL" smtClean="0"/>
           </a:p>
           <a:p>
             <a:pPr lvl="3"/>
@@ -2274,7 +2405,6 @@
               <a:rPr lang="nl-NL" smtClean="0"/>
               <a:t>Fourth level</a:t>
             </a:r>
-            <a:endParaRPr lang="nl-NL" smtClean="0"/>
           </a:p>
           <a:p>
             <a:pPr lvl="4"/>
@@ -2303,6 +2433,7 @@
           <a:p>
             <a:fld id="{A2052887-A491-A045-BA09-FC89F2030B98}" type="datetimeFigureOut">
               <a:rPr lang="en-US" smtClean="0"/>
+              <a:t>5/4/2017</a:t>
             </a:fld>
             <a:endParaRPr lang="en-US"/>
           </a:p>
@@ -2344,6 +2475,7 @@
           <a:p>
             <a:fld id="{8DF587FD-472B-5040-82FC-514079A450D3}" type="slidenum">
               <a:rPr lang="en-US" smtClean="0"/>
+              <a:t>‹nr.›</a:t>
             </a:fld>
             <a:endParaRPr lang="en-US"/>
           </a:p>
@@ -2414,6 +2546,7 @@
           <a:p>
             <a:fld id="{A2052887-A491-A045-BA09-FC89F2030B98}" type="datetimeFigureOut">
               <a:rPr lang="en-US" smtClean="0"/>
+              <a:t>5/4/2017</a:t>
             </a:fld>
             <a:endParaRPr lang="en-US"/>
           </a:p>
@@ -2455,6 +2588,7 @@
           <a:p>
             <a:fld id="{8DF587FD-472B-5040-82FC-514079A450D3}" type="slidenum">
               <a:rPr lang="en-US" smtClean="0"/>
+              <a:t>‹nr.›</a:t>
             </a:fld>
             <a:endParaRPr lang="en-US"/>
           </a:p>
@@ -2502,6 +2636,7 @@
           <a:p>
             <a:fld id="{A2052887-A491-A045-BA09-FC89F2030B98}" type="datetimeFigureOut">
               <a:rPr lang="en-US" smtClean="0"/>
+              <a:t>5/4/2017</a:t>
             </a:fld>
             <a:endParaRPr lang="en-US"/>
           </a:p>
@@ -2543,6 +2678,7 @@
           <a:p>
             <a:fld id="{8DF587FD-472B-5040-82FC-514079A450D3}" type="slidenum">
               <a:rPr lang="en-US" smtClean="0"/>
+              <a:t>‹nr.›</a:t>
             </a:fld>
             <a:endParaRPr lang="en-US"/>
           </a:p>
@@ -2658,7 +2794,6 @@
               <a:rPr lang="nl-NL" smtClean="0"/>
               <a:t>Click to edit Master text styles</a:t>
             </a:r>
-            <a:endParaRPr lang="nl-NL" smtClean="0"/>
           </a:p>
           <a:p>
             <a:pPr lvl="1"/>
@@ -2666,7 +2801,6 @@
               <a:rPr lang="nl-NL" smtClean="0"/>
               <a:t>Second level</a:t>
             </a:r>
-            <a:endParaRPr lang="nl-NL" smtClean="0"/>
           </a:p>
           <a:p>
             <a:pPr lvl="2"/>
@@ -2674,7 +2808,6 @@
               <a:rPr lang="nl-NL" smtClean="0"/>
               <a:t>Third level</a:t>
             </a:r>
-            <a:endParaRPr lang="nl-NL" smtClean="0"/>
           </a:p>
           <a:p>
             <a:pPr lvl="3"/>
@@ -2682,7 +2815,6 @@
               <a:rPr lang="nl-NL" smtClean="0"/>
               <a:t>Fourth level</a:t>
             </a:r>
-            <a:endParaRPr lang="nl-NL" smtClean="0"/>
           </a:p>
           <a:p>
             <a:pPr lvl="4"/>
@@ -2756,7 +2888,6 @@
               <a:rPr lang="nl-NL" smtClean="0"/>
               <a:t>Click to edit Master text styles</a:t>
             </a:r>
-            <a:endParaRPr lang="nl-NL" smtClean="0"/>
           </a:p>
         </p:txBody>
       </p:sp>
@@ -2777,6 +2908,7 @@
           <a:p>
             <a:fld id="{A2052887-A491-A045-BA09-FC89F2030B98}" type="datetimeFigureOut">
               <a:rPr lang="en-US" smtClean="0"/>
+              <a:t>5/4/2017</a:t>
             </a:fld>
             <a:endParaRPr lang="en-US"/>
           </a:p>
@@ -2818,6 +2950,7 @@
           <a:p>
             <a:fld id="{8DF587FD-472B-5040-82FC-514079A450D3}" type="slidenum">
               <a:rPr lang="en-US" smtClean="0"/>
+              <a:t>‹nr.›</a:t>
             </a:fld>
             <a:endParaRPr lang="en-US"/>
           </a:p>
@@ -3003,7 +3136,6 @@
               <a:rPr lang="nl-NL" smtClean="0"/>
               <a:t>Click to edit Master text styles</a:t>
             </a:r>
-            <a:endParaRPr lang="nl-NL" smtClean="0"/>
           </a:p>
         </p:txBody>
       </p:sp>
@@ -3024,6 +3156,7 @@
           <a:p>
             <a:fld id="{A2052887-A491-A045-BA09-FC89F2030B98}" type="datetimeFigureOut">
               <a:rPr lang="en-US" smtClean="0"/>
+              <a:t>5/4/2017</a:t>
             </a:fld>
             <a:endParaRPr lang="en-US"/>
           </a:p>
@@ -3065,6 +3198,7 @@
           <a:p>
             <a:fld id="{8DF587FD-472B-5040-82FC-514079A450D3}" type="slidenum">
               <a:rPr lang="en-US" smtClean="0"/>
+              <a:t>‹nr.›</a:t>
             </a:fld>
             <a:endParaRPr lang="en-US"/>
           </a:p>
@@ -3163,7 +3297,6 @@
               <a:rPr lang="nl-NL" smtClean="0"/>
               <a:t>Click to edit Master text styles</a:t>
             </a:r>
-            <a:endParaRPr lang="nl-NL" smtClean="0"/>
           </a:p>
           <a:p>
             <a:pPr lvl="1"/>
@@ -3171,7 +3304,6 @@
               <a:rPr lang="nl-NL" smtClean="0"/>
               <a:t>Second level</a:t>
             </a:r>
-            <a:endParaRPr lang="nl-NL" smtClean="0"/>
           </a:p>
           <a:p>
             <a:pPr lvl="2"/>
@@ -3179,7 +3311,6 @@
               <a:rPr lang="nl-NL" smtClean="0"/>
               <a:t>Third level</a:t>
             </a:r>
-            <a:endParaRPr lang="nl-NL" smtClean="0"/>
           </a:p>
           <a:p>
             <a:pPr lvl="3"/>
@@ -3187,7 +3318,6 @@
               <a:rPr lang="nl-NL" smtClean="0"/>
               <a:t>Fourth level</a:t>
             </a:r>
-            <a:endParaRPr lang="nl-NL" smtClean="0"/>
           </a:p>
           <a:p>
             <a:pPr lvl="4"/>
@@ -3234,6 +3364,7 @@
           <a:p>
             <a:fld id="{A2052887-A491-A045-BA09-FC89F2030B98}" type="datetimeFigureOut">
               <a:rPr lang="en-US" smtClean="0"/>
+              <a:t>5/4/2017</a:t>
             </a:fld>
             <a:endParaRPr lang="en-US"/>
           </a:p>
@@ -3311,6 +3442,7 @@
           <a:p>
             <a:fld id="{8DF587FD-472B-5040-82FC-514079A450D3}" type="slidenum">
               <a:rPr lang="en-US" smtClean="0"/>
+              <a:t>‹nr.›</a:t>
             </a:fld>
             <a:endParaRPr lang="en-US"/>
           </a:p>
@@ -3611,7 +3743,7 @@
           <p:nvPr/>
         </p:nvPicPr>
         <p:blipFill rotWithShape="1">
-          <a:blip r:embed="rId1">
+          <a:blip r:embed="rId2">
             <a:alphaModFix amt="38000"/>
             <a:extLst>
               <a:ext uri="{28A0092B-C50C-407E-A947-70E740481C1C}">
@@ -3690,14 +3822,6 @@
               </a:rPr>
               <a:t>Class ’95:</a:t>
             </a:r>
-            <a:endParaRPr lang="en-US" dirty="0" smtClean="0">
-              <a:solidFill>
-                <a:schemeClr val="tx1">
-                  <a:lumMod val="75000"/>
-                  <a:lumOff val="25000"/>
-                </a:schemeClr>
-              </a:solidFill>
-            </a:endParaRPr>
           </a:p>
           <a:p>
             <a:r>
@@ -3806,7 +3930,7 @@
           <p:nvPr/>
         </p:nvPicPr>
         <p:blipFill>
-          <a:blip r:embed="rId2">
+          <a:blip r:embed="rId3">
             <a:extLst>
               <a:ext uri="{28A0092B-C50C-407E-A947-70E740481C1C}">
                 <a14:useLocalDpi xmlns:a14="http://schemas.microsoft.com/office/drawing/2010/main" val="0"/>
@@ -3828,6 +3952,651 @@
         </p:spPr>
       </p:pic>
     </p:spTree>
+  </p:cSld>
+  <p:clrMapOvr>
+    <a:masterClrMapping/>
+  </p:clrMapOvr>
+  <p:timing>
+    <p:tnLst>
+      <p:par>
+        <p:cTn id="1" dur="indefinite" restart="never" nodeType="tmRoot"/>
+      </p:par>
+    </p:tnLst>
+  </p:timing>
+</p:sld>
+</file>
+
+<file path=ppt/slides/slide10.xml><?xml version="1.0" encoding="utf-8"?>
+<p:sld xmlns:a="http://schemas.openxmlformats.org/drawingml/2006/main" xmlns:r="http://schemas.openxmlformats.org/officeDocument/2006/relationships" xmlns:p="http://schemas.openxmlformats.org/presentationml/2006/main">
+  <p:cSld>
+    <p:spTree>
+      <p:nvGrpSpPr>
+        <p:cNvPr id="1" name=""/>
+        <p:cNvGrpSpPr/>
+        <p:nvPr/>
+      </p:nvGrpSpPr>
+      <p:grpSpPr>
+        <a:xfrm>
+          <a:off x="0" y="0"/>
+          <a:ext cx="0" cy="0"/>
+          <a:chOff x="0" y="0"/>
+          <a:chExt cx="0" cy="0"/>
+        </a:xfrm>
+      </p:grpSpPr>
+      <p:pic>
+        <p:nvPicPr>
+          <p:cNvPr id="4" name="Picture 3" descr="NFWI-UvA.jpg"/>
+          <p:cNvPicPr>
+            <a:picLocks noChangeAspect="1"/>
+          </p:cNvPicPr>
+          <p:nvPr/>
+        </p:nvPicPr>
+        <p:blipFill rotWithShape="1">
+          <a:blip r:embed="rId3">
+            <a:alphaModFix amt="38000"/>
+            <a:extLst>
+              <a:ext uri="{28A0092B-C50C-407E-A947-70E740481C1C}">
+                <a14:useLocalDpi xmlns:a14="http://schemas.microsoft.com/office/drawing/2010/main" val="0"/>
+              </a:ext>
+            </a:extLst>
+          </a:blip>
+          <a:srcRect l="6773" r="11075"/>
+          <a:stretch>
+            <a:fillRect/>
+          </a:stretch>
+        </p:blipFill>
+        <p:spPr>
+          <a:xfrm>
+            <a:off x="0" y="0"/>
+            <a:ext cx="9144000" cy="6875642"/>
+          </a:xfrm>
+          <a:prstGeom prst="rect">
+            <a:avLst/>
+          </a:prstGeom>
+        </p:spPr>
+      </p:pic>
+      <p:sp>
+        <p:nvSpPr>
+          <p:cNvPr id="2" name="Title 1"/>
+          <p:cNvSpPr>
+            <a:spLocks noGrp="1"/>
+          </p:cNvSpPr>
+          <p:nvPr>
+            <p:ph type="title"/>
+          </p:nvPr>
+        </p:nvSpPr>
+        <p:spPr/>
+        <p:txBody>
+          <a:bodyPr/>
+          <a:lstStyle/>
+          <a:p>
+            <a:r>
+              <a:rPr lang="en-US" dirty="0" smtClean="0"/>
+              <a:t>Simulated Annealing</a:t>
+            </a:r>
+            <a:endParaRPr lang="en-US" dirty="0"/>
+          </a:p>
+        </p:txBody>
+      </p:sp>
+      <p:sp>
+        <p:nvSpPr>
+          <p:cNvPr id="3" name="Content Placeholder 2"/>
+          <p:cNvSpPr>
+            <a:spLocks noGrp="1"/>
+          </p:cNvSpPr>
+          <p:nvPr>
+            <p:ph idx="1"/>
+          </p:nvPr>
+        </p:nvSpPr>
+        <p:spPr/>
+        <p:txBody>
+          <a:bodyPr>
+            <a:normAutofit/>
+          </a:bodyPr>
+          <a:lstStyle/>
+          <a:p>
+            <a:pPr marL="0" indent="0">
+              <a:buNone/>
+            </a:pPr>
+            <a:r>
+              <a:rPr lang="en-US" dirty="0" smtClean="0"/>
+              <a:t> </a:t>
+            </a:r>
+          </a:p>
+          <a:p>
+            <a:pPr>
+              <a:buFontTx/>
+              <a:buChar char="-"/>
+            </a:pPr>
+            <a:endParaRPr lang="en-US" dirty="0"/>
+          </a:p>
+        </p:txBody>
+      </p:sp>
+      <p:pic>
+        <p:nvPicPr>
+          <p:cNvPr id="6" name="Picture 5" descr="logo@2.png"/>
+          <p:cNvPicPr>
+            <a:picLocks noChangeAspect="1"/>
+          </p:cNvPicPr>
+          <p:nvPr/>
+        </p:nvPicPr>
+        <p:blipFill>
+          <a:blip r:embed="rId4">
+            <a:extLst>
+              <a:ext uri="{28A0092B-C50C-407E-A947-70E740481C1C}">
+                <a14:useLocalDpi xmlns:a14="http://schemas.microsoft.com/office/drawing/2010/main" val="0"/>
+              </a:ext>
+            </a:extLst>
+          </a:blip>
+          <a:stretch>
+            <a:fillRect/>
+          </a:stretch>
+        </p:blipFill>
+        <p:spPr>
+          <a:xfrm>
+            <a:off x="7641336" y="6126162"/>
+            <a:ext cx="1465796" cy="706247"/>
+          </a:xfrm>
+          <a:prstGeom prst="rect">
+            <a:avLst/>
+          </a:prstGeom>
+        </p:spPr>
+      </p:pic>
+      <p:pic>
+        <p:nvPicPr>
+          <p:cNvPr id="5" name="Afbeelding 4"/>
+          <p:cNvPicPr>
+            <a:picLocks noChangeAspect="1"/>
+          </p:cNvPicPr>
+          <p:nvPr/>
+        </p:nvPicPr>
+        <p:blipFill>
+          <a:blip r:embed="rId5">
+            <a:extLst>
+              <a:ext uri="{28A0092B-C50C-407E-A947-70E740481C1C}">
+                <a14:useLocalDpi xmlns:a14="http://schemas.microsoft.com/office/drawing/2010/main" val="0"/>
+              </a:ext>
+            </a:extLst>
+          </a:blip>
+          <a:stretch>
+            <a:fillRect/>
+          </a:stretch>
+        </p:blipFill>
+        <p:spPr>
+          <a:xfrm>
+            <a:off x="0" y="1748797"/>
+            <a:ext cx="4735773" cy="3667723"/>
+          </a:xfrm>
+          <a:prstGeom prst="rect">
+            <a:avLst/>
+          </a:prstGeom>
+        </p:spPr>
+      </p:pic>
+      <p:pic>
+        <p:nvPicPr>
+          <p:cNvPr id="7" name="Afbeelding 6"/>
+          <p:cNvPicPr>
+            <a:picLocks noChangeAspect="1"/>
+          </p:cNvPicPr>
+          <p:nvPr/>
+        </p:nvPicPr>
+        <p:blipFill>
+          <a:blip r:embed="rId6">
+            <a:extLst>
+              <a:ext uri="{28A0092B-C50C-407E-A947-70E740481C1C}">
+                <a14:useLocalDpi xmlns:a14="http://schemas.microsoft.com/office/drawing/2010/main" val="0"/>
+              </a:ext>
+            </a:extLst>
+          </a:blip>
+          <a:stretch>
+            <a:fillRect/>
+          </a:stretch>
+        </p:blipFill>
+        <p:spPr>
+          <a:xfrm>
+            <a:off x="4482303" y="1770413"/>
+            <a:ext cx="4890297" cy="3667723"/>
+          </a:xfrm>
+          <a:prstGeom prst="rect">
+            <a:avLst/>
+          </a:prstGeom>
+        </p:spPr>
+      </p:pic>
+    </p:spTree>
+    <p:extLst>
+      <p:ext uri="{BB962C8B-B14F-4D97-AF65-F5344CB8AC3E}">
+        <p14:creationId xmlns:p14="http://schemas.microsoft.com/office/powerpoint/2010/main" val="396270483"/>
+      </p:ext>
+    </p:extLst>
+  </p:cSld>
+  <p:clrMapOvr>
+    <a:masterClrMapping/>
+  </p:clrMapOvr>
+  <p:timing>
+    <p:tnLst>
+      <p:par>
+        <p:cTn id="1" dur="indefinite" restart="never" nodeType="tmRoot"/>
+      </p:par>
+    </p:tnLst>
+  </p:timing>
+</p:sld>
+</file>
+
+<file path=ppt/slides/slide11.xml><?xml version="1.0" encoding="utf-8"?>
+<p:sld xmlns:a="http://schemas.openxmlformats.org/drawingml/2006/main" xmlns:r="http://schemas.openxmlformats.org/officeDocument/2006/relationships" xmlns:p="http://schemas.openxmlformats.org/presentationml/2006/main">
+  <p:cSld>
+    <p:spTree>
+      <p:nvGrpSpPr>
+        <p:cNvPr id="1" name=""/>
+        <p:cNvGrpSpPr/>
+        <p:nvPr/>
+      </p:nvGrpSpPr>
+      <p:grpSpPr>
+        <a:xfrm>
+          <a:off x="0" y="0"/>
+          <a:ext cx="0" cy="0"/>
+          <a:chOff x="0" y="0"/>
+          <a:chExt cx="0" cy="0"/>
+        </a:xfrm>
+      </p:grpSpPr>
+      <p:pic>
+        <p:nvPicPr>
+          <p:cNvPr id="4" name="Picture 3" descr="NFWI-UvA.jpg"/>
+          <p:cNvPicPr>
+            <a:picLocks noChangeAspect="1"/>
+          </p:cNvPicPr>
+          <p:nvPr/>
+        </p:nvPicPr>
+        <p:blipFill rotWithShape="1">
+          <a:blip r:embed="rId2">
+            <a:alphaModFix amt="38000"/>
+            <a:extLst>
+              <a:ext uri="{28A0092B-C50C-407E-A947-70E740481C1C}">
+                <a14:useLocalDpi xmlns:a14="http://schemas.microsoft.com/office/drawing/2010/main" val="0"/>
+              </a:ext>
+            </a:extLst>
+          </a:blip>
+          <a:srcRect l="6773" r="11075"/>
+          <a:stretch>
+            <a:fillRect/>
+          </a:stretch>
+        </p:blipFill>
+        <p:spPr>
+          <a:xfrm>
+            <a:off x="0" y="0"/>
+            <a:ext cx="9144000" cy="6875642"/>
+          </a:xfrm>
+          <a:prstGeom prst="rect">
+            <a:avLst/>
+          </a:prstGeom>
+        </p:spPr>
+      </p:pic>
+      <p:sp>
+        <p:nvSpPr>
+          <p:cNvPr id="2" name="Title 1"/>
+          <p:cNvSpPr>
+            <a:spLocks noGrp="1"/>
+          </p:cNvSpPr>
+          <p:nvPr>
+            <p:ph type="title"/>
+          </p:nvPr>
+        </p:nvSpPr>
+        <p:spPr/>
+        <p:txBody>
+          <a:bodyPr/>
+          <a:lstStyle/>
+          <a:p>
+            <a:r>
+              <a:rPr lang="en-US" dirty="0" smtClean="0"/>
+              <a:t>Hoe </a:t>
+            </a:r>
+            <a:r>
+              <a:rPr lang="en-US" dirty="0" err="1" smtClean="0"/>
+              <a:t>verder</a:t>
+            </a:r>
+            <a:r>
+              <a:rPr lang="en-US" dirty="0" smtClean="0"/>
+              <a:t>?</a:t>
+            </a:r>
+            <a:endParaRPr lang="en-US" dirty="0"/>
+          </a:p>
+        </p:txBody>
+      </p:sp>
+      <p:sp>
+        <p:nvSpPr>
+          <p:cNvPr id="3" name="Content Placeholder 2"/>
+          <p:cNvSpPr>
+            <a:spLocks noGrp="1"/>
+          </p:cNvSpPr>
+          <p:nvPr>
+            <p:ph idx="1"/>
+          </p:nvPr>
+        </p:nvSpPr>
+        <p:spPr/>
+        <p:txBody>
+          <a:bodyPr>
+            <a:normAutofit/>
+          </a:bodyPr>
+          <a:lstStyle/>
+          <a:p>
+            <a:pPr marL="0" indent="0">
+              <a:buNone/>
+            </a:pPr>
+            <a:r>
+              <a:rPr lang="en-US" dirty="0" smtClean="0"/>
+              <a:t> </a:t>
+            </a:r>
+          </a:p>
+          <a:p>
+            <a:pPr>
+              <a:buFontTx/>
+              <a:buChar char="-"/>
+            </a:pPr>
+            <a:endParaRPr lang="en-US" dirty="0"/>
+          </a:p>
+        </p:txBody>
+      </p:sp>
+      <p:pic>
+        <p:nvPicPr>
+          <p:cNvPr id="6" name="Picture 5" descr="logo@2.png"/>
+          <p:cNvPicPr>
+            <a:picLocks noChangeAspect="1"/>
+          </p:cNvPicPr>
+          <p:nvPr/>
+        </p:nvPicPr>
+        <p:blipFill>
+          <a:blip r:embed="rId3">
+            <a:extLst>
+              <a:ext uri="{28A0092B-C50C-407E-A947-70E740481C1C}">
+                <a14:useLocalDpi xmlns:a14="http://schemas.microsoft.com/office/drawing/2010/main" val="0"/>
+              </a:ext>
+            </a:extLst>
+          </a:blip>
+          <a:stretch>
+            <a:fillRect/>
+          </a:stretch>
+        </p:blipFill>
+        <p:spPr>
+          <a:xfrm>
+            <a:off x="7641336" y="6126162"/>
+            <a:ext cx="1465796" cy="706247"/>
+          </a:xfrm>
+          <a:prstGeom prst="rect">
+            <a:avLst/>
+          </a:prstGeom>
+        </p:spPr>
+      </p:pic>
+      <p:sp>
+        <p:nvSpPr>
+          <p:cNvPr id="7" name="Content Placeholder 2"/>
+          <p:cNvSpPr txBox="1"/>
+          <p:nvPr/>
+        </p:nvSpPr>
+        <p:spPr>
+          <a:xfrm>
+            <a:off x="881987" y="1188303"/>
+            <a:ext cx="7657337" cy="4762121"/>
+          </a:xfrm>
+          <a:prstGeom prst="rect">
+            <a:avLst/>
+          </a:prstGeom>
+        </p:spPr>
+        <p:txBody>
+          <a:bodyPr vert="horz" lIns="91440" tIns="45720" rIns="91440" bIns="45720" rtlCol="0">
+            <a:normAutofit/>
+          </a:bodyPr>
+          <a:lstStyle>
+            <a:lvl1pPr marL="342900" indent="-342900" algn="l" defTabSz="457200" rtl="0" eaLnBrk="1" latinLnBrk="0" hangingPunct="1">
+              <a:spcBef>
+                <a:spcPct val="20000"/>
+              </a:spcBef>
+              <a:buFont typeface="Arial" panose="020B0604020202020204"/>
+              <a:buChar char="•"/>
+              <a:defRPr sz="3200" kern="1200">
+                <a:solidFill>
+                  <a:schemeClr val="tx1"/>
+                </a:solidFill>
+                <a:latin typeface="+mn-lt"/>
+                <a:ea typeface="+mn-ea"/>
+                <a:cs typeface="+mn-cs"/>
+              </a:defRPr>
+            </a:lvl1pPr>
+            <a:lvl2pPr marL="742950" indent="-285750" algn="l" defTabSz="457200" rtl="0" eaLnBrk="1" latinLnBrk="0" hangingPunct="1">
+              <a:spcBef>
+                <a:spcPct val="20000"/>
+              </a:spcBef>
+              <a:buFont typeface="Arial" panose="020B0604020202020204"/>
+              <a:buChar char="–"/>
+              <a:defRPr sz="2800" kern="1200">
+                <a:solidFill>
+                  <a:schemeClr val="tx1"/>
+                </a:solidFill>
+                <a:latin typeface="+mn-lt"/>
+                <a:ea typeface="+mn-ea"/>
+                <a:cs typeface="+mn-cs"/>
+              </a:defRPr>
+            </a:lvl2pPr>
+            <a:lvl3pPr marL="1143000" indent="-228600" algn="l" defTabSz="457200" rtl="0" eaLnBrk="1" latinLnBrk="0" hangingPunct="1">
+              <a:spcBef>
+                <a:spcPct val="20000"/>
+              </a:spcBef>
+              <a:buFont typeface="Arial" panose="020B0604020202020204"/>
+              <a:buChar char="•"/>
+              <a:defRPr sz="2400" kern="1200">
+                <a:solidFill>
+                  <a:schemeClr val="tx1"/>
+                </a:solidFill>
+                <a:latin typeface="+mn-lt"/>
+                <a:ea typeface="+mn-ea"/>
+                <a:cs typeface="+mn-cs"/>
+              </a:defRPr>
+            </a:lvl3pPr>
+            <a:lvl4pPr marL="1600200" indent="-228600" algn="l" defTabSz="457200" rtl="0" eaLnBrk="1" latinLnBrk="0" hangingPunct="1">
+              <a:spcBef>
+                <a:spcPct val="20000"/>
+              </a:spcBef>
+              <a:buFont typeface="Arial" panose="020B0604020202020204"/>
+              <a:buChar char="–"/>
+              <a:defRPr sz="2000" kern="1200">
+                <a:solidFill>
+                  <a:schemeClr val="tx1"/>
+                </a:solidFill>
+                <a:latin typeface="+mn-lt"/>
+                <a:ea typeface="+mn-ea"/>
+                <a:cs typeface="+mn-cs"/>
+              </a:defRPr>
+            </a:lvl4pPr>
+            <a:lvl5pPr marL="2057400" indent="-228600" algn="l" defTabSz="457200" rtl="0" eaLnBrk="1" latinLnBrk="0" hangingPunct="1">
+              <a:spcBef>
+                <a:spcPct val="20000"/>
+              </a:spcBef>
+              <a:buFont typeface="Arial" panose="020B0604020202020204"/>
+              <a:buChar char="»"/>
+              <a:defRPr sz="2000" kern="1200">
+                <a:solidFill>
+                  <a:schemeClr val="tx1"/>
+                </a:solidFill>
+                <a:latin typeface="+mn-lt"/>
+                <a:ea typeface="+mn-ea"/>
+                <a:cs typeface="+mn-cs"/>
+              </a:defRPr>
+            </a:lvl5pPr>
+            <a:lvl6pPr marL="2514600" indent="-228600" algn="l" defTabSz="457200" rtl="0" eaLnBrk="1" latinLnBrk="0" hangingPunct="1">
+              <a:spcBef>
+                <a:spcPct val="20000"/>
+              </a:spcBef>
+              <a:buFont typeface="Arial" panose="020B0604020202020204"/>
+              <a:buChar char="•"/>
+              <a:defRPr sz="2000" kern="1200">
+                <a:solidFill>
+                  <a:schemeClr val="tx1"/>
+                </a:solidFill>
+                <a:latin typeface="+mn-lt"/>
+                <a:ea typeface="+mn-ea"/>
+                <a:cs typeface="+mn-cs"/>
+              </a:defRPr>
+            </a:lvl6pPr>
+            <a:lvl7pPr marL="2971800" indent="-228600" algn="l" defTabSz="457200" rtl="0" eaLnBrk="1" latinLnBrk="0" hangingPunct="1">
+              <a:spcBef>
+                <a:spcPct val="20000"/>
+              </a:spcBef>
+              <a:buFont typeface="Arial" panose="020B0604020202020204"/>
+              <a:buChar char="•"/>
+              <a:defRPr sz="2000" kern="1200">
+                <a:solidFill>
+                  <a:schemeClr val="tx1"/>
+                </a:solidFill>
+                <a:latin typeface="+mn-lt"/>
+                <a:ea typeface="+mn-ea"/>
+                <a:cs typeface="+mn-cs"/>
+              </a:defRPr>
+            </a:lvl7pPr>
+            <a:lvl8pPr marL="3429000" indent="-228600" algn="l" defTabSz="457200" rtl="0" eaLnBrk="1" latinLnBrk="0" hangingPunct="1">
+              <a:spcBef>
+                <a:spcPct val="20000"/>
+              </a:spcBef>
+              <a:buFont typeface="Arial" panose="020B0604020202020204"/>
+              <a:buChar char="•"/>
+              <a:defRPr sz="2000" kern="1200">
+                <a:solidFill>
+                  <a:schemeClr val="tx1"/>
+                </a:solidFill>
+                <a:latin typeface="+mn-lt"/>
+                <a:ea typeface="+mn-ea"/>
+                <a:cs typeface="+mn-cs"/>
+              </a:defRPr>
+            </a:lvl8pPr>
+            <a:lvl9pPr marL="3886200" indent="-228600" algn="l" defTabSz="457200" rtl="0" eaLnBrk="1" latinLnBrk="0" hangingPunct="1">
+              <a:spcBef>
+                <a:spcPct val="20000"/>
+              </a:spcBef>
+              <a:buFont typeface="Arial" panose="020B0604020202020204"/>
+              <a:buChar char="•"/>
+              <a:defRPr sz="2000" kern="1200">
+                <a:solidFill>
+                  <a:schemeClr val="tx1"/>
+                </a:solidFill>
+                <a:latin typeface="+mn-lt"/>
+                <a:ea typeface="+mn-ea"/>
+                <a:cs typeface="+mn-cs"/>
+              </a:defRPr>
+            </a:lvl9pPr>
+          </a:lstStyle>
+          <a:p>
+            <a:pPr marL="0" indent="0">
+              <a:buNone/>
+            </a:pPr>
+            <a:endParaRPr lang="en-US" dirty="0" smtClean="0"/>
+          </a:p>
+          <a:p>
+            <a:pPr>
+              <a:buFontTx/>
+              <a:buChar char="-"/>
+            </a:pPr>
+            <a:r>
+              <a:rPr lang="en-US" dirty="0" err="1" smtClean="0"/>
+              <a:t>Lokalen</a:t>
+            </a:r>
+            <a:r>
+              <a:rPr lang="en-US" dirty="0" smtClean="0"/>
+              <a:t> </a:t>
+            </a:r>
+            <a:r>
+              <a:rPr lang="en-US" dirty="0" err="1" smtClean="0"/>
+              <a:t>toevoegen</a:t>
+            </a:r>
+            <a:endParaRPr lang="en-US" dirty="0" smtClean="0"/>
+          </a:p>
+          <a:p>
+            <a:pPr marL="0" indent="0">
+              <a:buNone/>
+            </a:pPr>
+            <a:r>
+              <a:rPr lang="en-US" dirty="0" smtClean="0"/>
+              <a:t>-   Meer </a:t>
+            </a:r>
+            <a:r>
+              <a:rPr lang="en-US" dirty="0" err="1"/>
+              <a:t>simulaties</a:t>
+            </a:r>
+            <a:r>
+              <a:rPr lang="en-US" dirty="0"/>
+              <a:t> </a:t>
+            </a:r>
+            <a:endParaRPr lang="en-US" dirty="0" smtClean="0"/>
+          </a:p>
+          <a:p>
+            <a:pPr>
+              <a:buFontTx/>
+              <a:buChar char="-"/>
+            </a:pPr>
+            <a:r>
+              <a:rPr lang="en-US" dirty="0" smtClean="0"/>
+              <a:t>Greedy </a:t>
+            </a:r>
+            <a:r>
+              <a:rPr lang="en-US" dirty="0" err="1" smtClean="0"/>
+              <a:t>beginsituatie</a:t>
+            </a:r>
+            <a:endParaRPr lang="en-US" dirty="0" smtClean="0"/>
+          </a:p>
+          <a:p>
+            <a:pPr>
+              <a:buFontTx/>
+              <a:buChar char="-"/>
+            </a:pPr>
+            <a:r>
+              <a:rPr lang="nl-NL" altLang="en-US" dirty="0" smtClean="0"/>
+              <a:t>Meerdere </a:t>
+            </a:r>
+            <a:r>
+              <a:rPr lang="nl-NL" altLang="en-US" dirty="0" err="1" smtClean="0"/>
+              <a:t>coolingschemes</a:t>
+            </a:r>
+            <a:r>
+              <a:rPr lang="nl-NL" altLang="en-US" dirty="0" smtClean="0"/>
+              <a:t> proberen</a:t>
+            </a:r>
+          </a:p>
+          <a:p>
+            <a:pPr>
+              <a:buFontTx/>
+              <a:buChar char="-"/>
+            </a:pPr>
+            <a:r>
+              <a:rPr lang="nl-NL" altLang="en-US" dirty="0" smtClean="0"/>
+              <a:t>Roostervisualisatie</a:t>
+            </a:r>
+            <a:endParaRPr lang="nl-NL" altLang="en-US" dirty="0" smtClean="0"/>
+          </a:p>
+          <a:p>
+            <a:pPr marL="0" indent="0">
+              <a:buNone/>
+            </a:pPr>
+            <a:endParaRPr lang="nl-NL" altLang="en-US" dirty="0" smtClean="0"/>
+          </a:p>
+          <a:p>
+            <a:pPr>
+              <a:buFontTx/>
+              <a:buChar char="-"/>
+            </a:pPr>
+            <a:endParaRPr lang="nl-NL" altLang="en-US" dirty="0" smtClean="0"/>
+          </a:p>
+          <a:p>
+            <a:pPr>
+              <a:buFontTx/>
+              <a:buChar char="-"/>
+            </a:pPr>
+            <a:endParaRPr lang="en-US" dirty="0"/>
+          </a:p>
+        </p:txBody>
+      </p:sp>
+    </p:spTree>
+    <p:extLst>
+      <p:ext uri="{BB962C8B-B14F-4D97-AF65-F5344CB8AC3E}">
+        <p14:creationId xmlns:p14="http://schemas.microsoft.com/office/powerpoint/2010/main" val="3128418722"/>
+      </p:ext>
+    </p:extLst>
   </p:cSld>
   <p:clrMapOvr>
     <a:masterClrMapping/>
@@ -3868,7 +4637,7 @@
           <p:nvPr/>
         </p:nvPicPr>
         <p:blipFill rotWithShape="1">
-          <a:blip r:embed="rId1">
+          <a:blip r:embed="rId3">
             <a:alphaModFix amt="38000"/>
             <a:extLst>
               <a:ext uri="{28A0092B-C50C-407E-A947-70E740481C1C}">
@@ -3972,7 +4741,6 @@
               <a:rPr lang="en-US" dirty="0" smtClean="0"/>
               <a:t> </a:t>
             </a:r>
-            <a:endParaRPr lang="en-US" dirty="0" smtClean="0"/>
           </a:p>
           <a:p>
             <a:pPr marL="0" indent="0">
@@ -3986,7 +4754,6 @@
               <a:rPr lang="nl-NL" altLang="en-US" dirty="0" smtClean="0"/>
               <a:t>vakken, ruim 600 studenten. </a:t>
             </a:r>
-            <a:endParaRPr lang="nl-NL" altLang="en-US" dirty="0" smtClean="0"/>
           </a:p>
           <a:p>
             <a:pPr marL="0" indent="0">
@@ -4014,7 +4781,6 @@
               <a:rPr lang="en-US" dirty="0" smtClean="0"/>
               <a:t> het rooster:</a:t>
             </a:r>
-            <a:endParaRPr lang="en-US" dirty="0" smtClean="0"/>
           </a:p>
           <a:p>
             <a:pPr>
@@ -4046,15 +4812,11 @@
             </a:r>
             <a:r>
               <a:rPr lang="en-US" dirty="0" smtClean="0"/>
-              <a:t>					in </a:t>
-            </a:r>
-            <a:r>
-              <a:rPr lang="en-US" dirty="0" err="1" smtClean="0"/>
-              <a:t>totaal</a:t>
+              <a:t>			</a:t>
             </a:r>
             <a:r>
               <a:rPr lang="en-US" dirty="0" smtClean="0"/>
-              <a:t> 72 </a:t>
+              <a:t> </a:t>
             </a:r>
             <a:endParaRPr lang="en-US" dirty="0" smtClean="0"/>
           </a:p>
@@ -4082,7 +4844,6 @@
               <a:rPr lang="en-US" dirty="0" smtClean="0"/>
               <a:t>Students</a:t>
             </a:r>
-            <a:endParaRPr lang="en-US" dirty="0" smtClean="0"/>
           </a:p>
           <a:p>
             <a:pPr>
@@ -4109,7 +4870,6 @@
               <a:rPr lang="en-US" dirty="0" smtClean="0"/>
               <a:t> 17:00)</a:t>
             </a:r>
-            <a:endParaRPr lang="en-US" dirty="0" smtClean="0"/>
           </a:p>
           <a:p>
             <a:pPr>
@@ -4117,53 +4877,6 @@
               <a:buChar char="-"/>
             </a:pPr>
             <a:endParaRPr lang="en-US" dirty="0"/>
-          </a:p>
-        </p:txBody>
-      </p:sp>
-      <p:sp>
-        <p:nvSpPr>
-          <p:cNvPr id="5" name="Right Brace 4"/>
-          <p:cNvSpPr/>
-          <p:nvPr/>
-        </p:nvSpPr>
-        <p:spPr>
-          <a:xfrm>
-            <a:off x="3492668" y="3757567"/>
-            <a:ext cx="776149" cy="1111393"/>
-          </a:xfrm>
-          <a:prstGeom prst="rightBrace">
-            <a:avLst/>
-          </a:prstGeom>
-        </p:spPr>
-        <p:style>
-          <a:lnRef idx="3">
-            <a:schemeClr val="dk1"/>
-          </a:lnRef>
-          <a:fillRef idx="0">
-            <a:schemeClr val="dk1"/>
-          </a:fillRef>
-          <a:effectRef idx="2">
-            <a:schemeClr val="dk1"/>
-          </a:effectRef>
-          <a:fontRef idx="minor">
-            <a:schemeClr val="tx1"/>
-          </a:fontRef>
-        </p:style>
-        <p:txBody>
-          <a:bodyPr rtlCol="0" anchor="ctr"/>
-          <a:lstStyle/>
-          <a:p>
-            <a:pPr algn="ctr"/>
-            <a:endParaRPr lang="en-US">
-              <a:ln>
-                <a:solidFill>
-                  <a:srgbClr val="000000"/>
-                </a:solidFill>
-              </a:ln>
-              <a:solidFill>
-                <a:srgbClr val="404040"/>
-              </a:solidFill>
-            </a:endParaRPr>
           </a:p>
         </p:txBody>
       </p:sp>
@@ -4176,7 +4889,7 @@
           <p:nvPr/>
         </p:nvPicPr>
         <p:blipFill>
-          <a:blip r:embed="rId2">
+          <a:blip r:embed="rId4">
             <a:extLst>
               <a:ext uri="{28A0092B-C50C-407E-A947-70E740481C1C}">
                 <a14:useLocalDpi xmlns:a14="http://schemas.microsoft.com/office/drawing/2010/main" val="0"/>
@@ -4238,7 +4951,7 @@
           <p:nvPr/>
         </p:nvPicPr>
         <p:blipFill rotWithShape="1">
-          <a:blip r:embed="rId1">
+          <a:blip r:embed="rId2">
             <a:alphaModFix amt="38000"/>
             <a:extLst>
               <a:ext uri="{28A0092B-C50C-407E-A947-70E740481C1C}">
@@ -4320,7 +5033,6 @@
               <a:rPr lang="en-US" dirty="0" smtClean="0"/>
               <a:t> </a:t>
             </a:r>
-            <a:endParaRPr lang="en-US" dirty="0" smtClean="0"/>
           </a:p>
           <a:p>
             <a:pPr>
@@ -4338,7 +5050,6 @@
               <a:rPr lang="nl-NL" altLang="en-US" dirty="0"/>
               <a:t>Iteratieve algoritmes: </a:t>
             </a:r>
-            <a:endParaRPr lang="nl-NL" altLang="en-US" dirty="0"/>
           </a:p>
           <a:p>
             <a:pPr>
@@ -4351,9 +5062,6 @@
               </a:rPr>
               <a:t>Hill Climber</a:t>
             </a:r>
-            <a:endParaRPr lang="nl-NL" altLang="en-US" dirty="0" smtClean="0">
-              <a:sym typeface="+mn-ea"/>
-            </a:endParaRPr>
           </a:p>
           <a:p>
             <a:pPr>
@@ -4386,7 +5094,7 @@
           <p:nvPr/>
         </p:nvPicPr>
         <p:blipFill>
-          <a:blip r:embed="rId2">
+          <a:blip r:embed="rId3">
             <a:extLst>
               <a:ext uri="{28A0092B-C50C-407E-A947-70E740481C1C}">
                 <a14:useLocalDpi xmlns:a14="http://schemas.microsoft.com/office/drawing/2010/main" val="0"/>
@@ -4448,7 +5156,7 @@
           <p:nvPr/>
         </p:nvPicPr>
         <p:blipFill rotWithShape="1">
-          <a:blip r:embed="rId1">
+          <a:blip r:embed="rId2">
             <a:alphaModFix amt="38000"/>
             <a:extLst>
               <a:ext uri="{28A0092B-C50C-407E-A947-70E740481C1C}">
@@ -4511,7 +5219,7 @@
         <p:spPr/>
         <p:txBody>
           <a:bodyPr>
-            <a:normAutofit lnSpcReduction="20000"/>
+            <a:normAutofit fontScale="92500" lnSpcReduction="20000"/>
           </a:bodyPr>
           <a:lstStyle/>
           <a:p>
@@ -4522,7 +5230,6 @@
               <a:rPr lang="en-US" dirty="0" smtClean="0"/>
               <a:t> </a:t>
             </a:r>
-            <a:endParaRPr lang="en-US" dirty="0" smtClean="0"/>
           </a:p>
           <a:p>
             <a:pPr marL="0" indent="0">
@@ -4552,12 +5259,19 @@
               <a:rPr lang="en-US" dirty="0" smtClean="0"/>
               <a:t>?</a:t>
             </a:r>
-            <a:endParaRPr lang="en-US" dirty="0" smtClean="0"/>
           </a:p>
           <a:p>
             <a:pPr marL="0" indent="0">
               <a:buNone/>
             </a:pPr>
+            <a:r>
+              <a:rPr lang="en-US" dirty="0" smtClean="0"/>
+              <a:t>-   </a:t>
+            </a:r>
+            <a:r>
+              <a:rPr lang="en-US" dirty="0" err="1" smtClean="0"/>
+              <a:t>Literatuuronderzoek</a:t>
+            </a:r>
             <a:endParaRPr lang="en-US" dirty="0"/>
           </a:p>
           <a:p>
@@ -4581,7 +5295,6 @@
               <a:rPr lang="nl-NL" altLang="en-US" dirty="0" err="1" smtClean="0"/>
               <a:t>inlezen</a:t>
             </a:r>
-            <a:endParaRPr lang="nl-NL" altLang="en-US" dirty="0" err="1" smtClean="0"/>
           </a:p>
           <a:p>
             <a:pPr>
@@ -4592,7 +5305,6 @@
               <a:rPr lang="nl-NL" altLang="en-US" dirty="0" err="1" smtClean="0"/>
               <a:t>Rooster object met bijbehorende methods</a:t>
             </a:r>
-            <a:endParaRPr lang="nl-NL" altLang="en-US" dirty="0" err="1" smtClean="0"/>
           </a:p>
           <a:p>
             <a:pPr>
@@ -4611,9 +5323,6 @@
               </a:rPr>
               <a:t>functie</a:t>
             </a:r>
-            <a:endParaRPr lang="en-US" dirty="0" err="1" smtClean="0">
-              <a:sym typeface="+mn-ea"/>
-            </a:endParaRPr>
           </a:p>
           <a:p>
             <a:pPr>
@@ -4637,7 +5346,6 @@
               <a:rPr lang="en-US" dirty="0" smtClean="0"/>
               <a:t>Hill Climber </a:t>
             </a:r>
-            <a:endParaRPr lang="en-US" dirty="0" smtClean="0"/>
           </a:p>
           <a:p>
             <a:pPr>
@@ -4661,7 +5369,7 @@
           <p:nvPr/>
         </p:nvPicPr>
         <p:blipFill>
-          <a:blip r:embed="rId2">
+          <a:blip r:embed="rId3">
             <a:extLst>
               <a:ext uri="{28A0092B-C50C-407E-A947-70E740481C1C}">
                 <a14:useLocalDpi xmlns:a14="http://schemas.microsoft.com/office/drawing/2010/main" val="0"/>
@@ -4723,7 +5431,7 @@
           <p:nvPr/>
         </p:nvPicPr>
         <p:blipFill rotWithShape="1">
-          <a:blip r:embed="rId1">
+          <a:blip r:embed="rId2">
             <a:alphaModFix amt="38000"/>
             <a:extLst>
               <a:ext uri="{28A0092B-C50C-407E-A947-70E740481C1C}">
@@ -4786,7 +5494,7 @@
         <p:spPr/>
         <p:txBody>
           <a:bodyPr>
-            <a:normAutofit lnSpcReduction="20000"/>
+            <a:normAutofit/>
           </a:bodyPr>
           <a:lstStyle/>
           <a:p>
@@ -4797,7 +5505,6 @@
               <a:rPr lang="en-US" dirty="0" smtClean="0"/>
               <a:t> </a:t>
             </a:r>
-            <a:endParaRPr lang="en-US" dirty="0" smtClean="0"/>
           </a:p>
           <a:p>
             <a:pPr marL="0" indent="0">
@@ -4835,7 +5542,6 @@
               <a:rPr lang="en-US" dirty="0" smtClean="0"/>
               <a:t>?</a:t>
             </a:r>
-            <a:endParaRPr lang="en-US" dirty="0" smtClean="0"/>
           </a:p>
           <a:p>
             <a:pPr marL="0" indent="0">
@@ -4852,7 +5558,6 @@
               <a:rPr lang="nl-NL" altLang="en-US" dirty="0"/>
               <a:t>Lokalen bij het probleem betrekken</a:t>
             </a:r>
-            <a:endParaRPr lang="nl-NL" altLang="en-US" dirty="0"/>
           </a:p>
           <a:p>
             <a:pPr>
@@ -4861,7 +5566,21 @@
             </a:pPr>
             <a:r>
               <a:rPr lang="nl-NL" altLang="en-US" dirty="0"/>
-              <a:t>Greedy algoritme als beginsituatie</a:t>
+              <a:t>Greedy algoritme als </a:t>
+            </a:r>
+            <a:r>
+              <a:rPr lang="nl-NL" altLang="en-US" dirty="0" smtClean="0"/>
+              <a:t>beginsituatie</a:t>
+            </a:r>
+          </a:p>
+          <a:p>
+            <a:pPr>
+              <a:buFontTx/>
+              <a:buChar char="-"/>
+            </a:pPr>
+            <a:r>
+              <a:rPr lang="nl-NL" altLang="en-US" dirty="0" smtClean="0"/>
+              <a:t>Bonuspunt toevoegen</a:t>
             </a:r>
             <a:endParaRPr lang="nl-NL" altLang="en-US" dirty="0"/>
           </a:p>
@@ -4883,7 +5602,7 @@
           <p:nvPr/>
         </p:nvPicPr>
         <p:blipFill>
-          <a:blip r:embed="rId2">
+          <a:blip r:embed="rId3">
             <a:extLst>
               <a:ext uri="{28A0092B-C50C-407E-A947-70E740481C1C}">
                 <a14:useLocalDpi xmlns:a14="http://schemas.microsoft.com/office/drawing/2010/main" val="0"/>
@@ -4945,7 +5664,7 @@
           <p:nvPr/>
         </p:nvPicPr>
         <p:blipFill rotWithShape="1">
-          <a:blip r:embed="rId1">
+          <a:blip r:embed="rId3">
             <a:alphaModFix amt="38000"/>
             <a:extLst>
               <a:ext uri="{28A0092B-C50C-407E-A947-70E740481C1C}">
@@ -4985,11 +5704,7 @@
           <a:p>
             <a:r>
               <a:rPr lang="en-US" dirty="0" smtClean="0"/>
-              <a:t>Rating </a:t>
-            </a:r>
-            <a:r>
-              <a:rPr lang="en-US" dirty="0" err="1" smtClean="0"/>
-              <a:t>functie</a:t>
+              <a:t>Random rooster</a:t>
             </a:r>
             <a:endParaRPr lang="en-US" dirty="0"/>
           </a:p>
@@ -5019,7 +5734,6 @@
               <a:rPr lang="en-US" dirty="0" smtClean="0"/>
               <a:t> </a:t>
             </a:r>
-            <a:endParaRPr lang="en-US" dirty="0" smtClean="0"/>
           </a:p>
           <a:p>
             <a:pPr>
@@ -5039,7 +5753,186 @@
           <p:nvPr/>
         </p:nvPicPr>
         <p:blipFill>
+          <a:blip r:embed="rId4">
+            <a:extLst>
+              <a:ext uri="{28A0092B-C50C-407E-A947-70E740481C1C}">
+                <a14:useLocalDpi xmlns:a14="http://schemas.microsoft.com/office/drawing/2010/main" val="0"/>
+              </a:ext>
+            </a:extLst>
+          </a:blip>
+          <a:stretch>
+            <a:fillRect/>
+          </a:stretch>
+        </p:blipFill>
+        <p:spPr>
+          <a:xfrm>
+            <a:off x="7641336" y="6126162"/>
+            <a:ext cx="1465796" cy="706247"/>
+          </a:xfrm>
+          <a:prstGeom prst="rect">
+            <a:avLst/>
+          </a:prstGeom>
+        </p:spPr>
+      </p:pic>
+      <p:pic>
+        <p:nvPicPr>
+          <p:cNvPr id="5" name="Afbeelding 4"/>
+          <p:cNvPicPr>
+            <a:picLocks noChangeAspect="1"/>
+          </p:cNvPicPr>
+          <p:nvPr/>
+        </p:nvPicPr>
+        <p:blipFill>
+          <a:blip r:embed="rId5"/>
+          <a:stretch>
+            <a:fillRect/>
+          </a:stretch>
+        </p:blipFill>
+        <p:spPr>
+          <a:xfrm>
+            <a:off x="3302155" y="1318279"/>
+            <a:ext cx="2921226" cy="5514130"/>
+          </a:xfrm>
+          <a:prstGeom prst="rect">
+            <a:avLst/>
+          </a:prstGeom>
+        </p:spPr>
+      </p:pic>
+    </p:spTree>
+  </p:cSld>
+  <p:clrMapOvr>
+    <a:masterClrMapping/>
+  </p:clrMapOvr>
+  <p:timing>
+    <p:tnLst>
+      <p:par>
+        <p:cTn id="1" dur="indefinite" restart="never" nodeType="tmRoot"/>
+      </p:par>
+    </p:tnLst>
+  </p:timing>
+</p:sld>
+</file>
+
+<file path=ppt/slides/slide7.xml><?xml version="1.0" encoding="utf-8"?>
+<p:sld xmlns:a="http://schemas.openxmlformats.org/drawingml/2006/main" xmlns:r="http://schemas.openxmlformats.org/officeDocument/2006/relationships" xmlns:p="http://schemas.openxmlformats.org/presentationml/2006/main">
+  <p:cSld>
+    <p:spTree>
+      <p:nvGrpSpPr>
+        <p:cNvPr id="1" name=""/>
+        <p:cNvGrpSpPr/>
+        <p:nvPr/>
+      </p:nvGrpSpPr>
+      <p:grpSpPr>
+        <a:xfrm>
+          <a:off x="0" y="0"/>
+          <a:ext cx="0" cy="0"/>
+          <a:chOff x="0" y="0"/>
+          <a:chExt cx="0" cy="0"/>
+        </a:xfrm>
+      </p:grpSpPr>
+      <p:pic>
+        <p:nvPicPr>
+          <p:cNvPr id="4" name="Picture 3" descr="NFWI-UvA.jpg"/>
+          <p:cNvPicPr>
+            <a:picLocks noChangeAspect="1"/>
+          </p:cNvPicPr>
+          <p:nvPr/>
+        </p:nvPicPr>
+        <p:blipFill rotWithShape="1">
           <a:blip r:embed="rId2">
+            <a:alphaModFix amt="38000"/>
+            <a:extLst>
+              <a:ext uri="{28A0092B-C50C-407E-A947-70E740481C1C}">
+                <a14:useLocalDpi xmlns:a14="http://schemas.microsoft.com/office/drawing/2010/main" val="0"/>
+              </a:ext>
+            </a:extLst>
+          </a:blip>
+          <a:srcRect l="6773" r="11075"/>
+          <a:stretch>
+            <a:fillRect/>
+          </a:stretch>
+        </p:blipFill>
+        <p:spPr>
+          <a:xfrm>
+            <a:off x="0" y="0"/>
+            <a:ext cx="9144000" cy="6875642"/>
+          </a:xfrm>
+          <a:prstGeom prst="rect">
+            <a:avLst/>
+          </a:prstGeom>
+        </p:spPr>
+      </p:pic>
+      <p:sp>
+        <p:nvSpPr>
+          <p:cNvPr id="2" name="Title 1"/>
+          <p:cNvSpPr>
+            <a:spLocks noGrp="1"/>
+          </p:cNvSpPr>
+          <p:nvPr>
+            <p:ph type="title"/>
+          </p:nvPr>
+        </p:nvSpPr>
+        <p:spPr/>
+        <p:txBody>
+          <a:bodyPr/>
+          <a:lstStyle/>
+          <a:p>
+            <a:r>
+              <a:rPr lang="en-US" dirty="0" smtClean="0"/>
+              <a:t>Rating </a:t>
+            </a:r>
+            <a:r>
+              <a:rPr lang="en-US" dirty="0" err="1" smtClean="0"/>
+              <a:t>functie</a:t>
+            </a:r>
+            <a:endParaRPr lang="en-US" dirty="0"/>
+          </a:p>
+        </p:txBody>
+      </p:sp>
+      <p:sp>
+        <p:nvSpPr>
+          <p:cNvPr id="3" name="Content Placeholder 2"/>
+          <p:cNvSpPr>
+            <a:spLocks noGrp="1"/>
+          </p:cNvSpPr>
+          <p:nvPr>
+            <p:ph idx="1"/>
+          </p:nvPr>
+        </p:nvSpPr>
+        <p:spPr/>
+        <p:txBody>
+          <a:bodyPr>
+            <a:normAutofit/>
+          </a:bodyPr>
+          <a:lstStyle/>
+          <a:p>
+            <a:pPr marL="0" indent="0">
+              <a:buNone/>
+            </a:pPr>
+            <a:r>
+              <a:rPr lang="en-US" dirty="0" smtClean="0"/>
+              <a:t> </a:t>
+            </a:r>
+          </a:p>
+          <a:p>
+            <a:pPr>
+              <a:buFontTx/>
+              <a:buChar char="-"/>
+            </a:pPr>
+            <a:endParaRPr lang="en-US" dirty="0"/>
+          </a:p>
+        </p:txBody>
+      </p:sp>
+      <p:pic>
+        <p:nvPicPr>
+          <p:cNvPr id="6" name="Picture 5" descr="logo@2.png"/>
+          <p:cNvPicPr>
+            <a:picLocks noChangeAspect="1"/>
+          </p:cNvPicPr>
+          <p:nvPr/>
+        </p:nvPicPr>
+        <p:blipFill>
+          <a:blip r:embed="rId3">
             <a:extLst>
               <a:ext uri="{28A0092B-C50C-407E-A947-70E740481C1C}">
                 <a14:useLocalDpi xmlns:a14="http://schemas.microsoft.com/office/drawing/2010/main" val="0"/>
@@ -5225,7 +6118,6 @@
               <a:rPr lang="en-US" dirty="0" smtClean="0"/>
               <a:t> </a:t>
             </a:r>
-            <a:endParaRPr lang="en-US" dirty="0" smtClean="0"/>
           </a:p>
           <a:p>
             <a:pPr marL="0" indent="0">
@@ -5240,7 +6132,6 @@
               <a:rPr lang="en-US" dirty="0" smtClean="0"/>
               <a:t>:</a:t>
             </a:r>
-            <a:endParaRPr lang="en-US" dirty="0" smtClean="0"/>
           </a:p>
           <a:p>
             <a:pPr>
@@ -5299,7 +6190,6 @@
               <a:rPr lang="en-US" dirty="0" smtClean="0"/>
               <a:t>)</a:t>
             </a:r>
-            <a:endParaRPr lang="en-US" dirty="0" smtClean="0"/>
           </a:p>
           <a:p>
             <a:pPr>
@@ -5370,7 +6260,6 @@
               <a:rPr lang="en-US" dirty="0" smtClean="0"/>
               <a:t>)</a:t>
             </a:r>
-            <a:endParaRPr lang="en-US" dirty="0" smtClean="0"/>
           </a:p>
           <a:p>
             <a:pPr>
@@ -5381,7 +6270,6 @@
               <a:rPr lang="nl-NL" altLang="en-US" dirty="0" smtClean="0"/>
               <a:t>N activiteiten moeten over N dagen verdeeld worden. </a:t>
             </a:r>
-            <a:endParaRPr lang="nl-NL" altLang="en-US" dirty="0" smtClean="0"/>
           </a:p>
           <a:p>
             <a:pPr>
@@ -5392,158 +6280,6 @@
           </a:p>
         </p:txBody>
       </p:sp>
-    </p:spTree>
-  </p:cSld>
-  <p:clrMapOvr>
-    <a:masterClrMapping/>
-  </p:clrMapOvr>
-  <p:timing>
-    <p:tnLst>
-      <p:par>
-        <p:cTn id="1" dur="indefinite" restart="never" nodeType="tmRoot"/>
-      </p:par>
-    </p:tnLst>
-  </p:timing>
-</p:sld>
-</file>
-
-<file path=ppt/slides/slide7.xml><?xml version="1.0" encoding="utf-8"?>
-<p:sld xmlns:a="http://schemas.openxmlformats.org/drawingml/2006/main" xmlns:r="http://schemas.openxmlformats.org/officeDocument/2006/relationships" xmlns:p="http://schemas.openxmlformats.org/presentationml/2006/main">
-  <p:cSld>
-    <p:spTree>
-      <p:nvGrpSpPr>
-        <p:cNvPr id="1" name=""/>
-        <p:cNvGrpSpPr/>
-        <p:nvPr/>
-      </p:nvGrpSpPr>
-      <p:grpSpPr>
-        <a:xfrm>
-          <a:off x="0" y="0"/>
-          <a:ext cx="0" cy="0"/>
-          <a:chOff x="0" y="0"/>
-          <a:chExt cx="0" cy="0"/>
-        </a:xfrm>
-      </p:grpSpPr>
-      <p:pic>
-        <p:nvPicPr>
-          <p:cNvPr id="4" name="Picture 3" descr="NFWI-UvA.jpg"/>
-          <p:cNvPicPr>
-            <a:picLocks noChangeAspect="1"/>
-          </p:cNvPicPr>
-          <p:nvPr/>
-        </p:nvPicPr>
-        <p:blipFill rotWithShape="1">
-          <a:blip r:embed="rId1">
-            <a:alphaModFix amt="38000"/>
-            <a:extLst>
-              <a:ext uri="{28A0092B-C50C-407E-A947-70E740481C1C}">
-                <a14:useLocalDpi xmlns:a14="http://schemas.microsoft.com/office/drawing/2010/main" val="0"/>
-              </a:ext>
-            </a:extLst>
-          </a:blip>
-          <a:srcRect l="6773" r="11075"/>
-          <a:stretch>
-            <a:fillRect/>
-          </a:stretch>
-        </p:blipFill>
-        <p:spPr>
-          <a:xfrm>
-            <a:off x="0" y="0"/>
-            <a:ext cx="9144000" cy="6875642"/>
-          </a:xfrm>
-          <a:prstGeom prst="rect">
-            <a:avLst/>
-          </a:prstGeom>
-        </p:spPr>
-      </p:pic>
-      <p:sp>
-        <p:nvSpPr>
-          <p:cNvPr id="2" name="Title 1"/>
-          <p:cNvSpPr>
-            <a:spLocks noGrp="1"/>
-          </p:cNvSpPr>
-          <p:nvPr>
-            <p:ph type="title"/>
-          </p:nvPr>
-        </p:nvSpPr>
-        <p:spPr/>
-        <p:txBody>
-          <a:bodyPr/>
-          <a:lstStyle/>
-          <a:p>
-            <a:r>
-              <a:rPr lang="en-US" dirty="0" smtClean="0"/>
-              <a:t>Random rooster</a:t>
-            </a:r>
-            <a:endParaRPr lang="en-US" dirty="0"/>
-          </a:p>
-        </p:txBody>
-      </p:sp>
-      <p:sp>
-        <p:nvSpPr>
-          <p:cNvPr id="3" name="Content Placeholder 2"/>
-          <p:cNvSpPr>
-            <a:spLocks noGrp="1"/>
-          </p:cNvSpPr>
-          <p:nvPr>
-            <p:ph idx="1"/>
-          </p:nvPr>
-        </p:nvSpPr>
-        <p:spPr/>
-        <p:txBody>
-          <a:bodyPr>
-            <a:normAutofit/>
-          </a:bodyPr>
-          <a:lstStyle/>
-          <a:p>
-            <a:pPr marL="0" indent="0">
-              <a:buNone/>
-            </a:pPr>
-            <a:r>
-              <a:rPr lang="en-US" dirty="0" smtClean="0"/>
-              <a:t> </a:t>
-            </a:r>
-            <a:endParaRPr lang="en-US" dirty="0" smtClean="0"/>
-          </a:p>
-          <a:p>
-            <a:pPr>
-              <a:buFontTx/>
-              <a:buChar char="-"/>
-            </a:pPr>
-            <a:endParaRPr lang="en-US" dirty="0"/>
-          </a:p>
-        </p:txBody>
-      </p:sp>
-      <p:pic>
-        <p:nvPicPr>
-          <p:cNvPr id="6" name="Picture 5" descr="logo@2.png"/>
-          <p:cNvPicPr>
-            <a:picLocks noChangeAspect="1"/>
-          </p:cNvPicPr>
-          <p:nvPr/>
-        </p:nvPicPr>
-        <p:blipFill>
-          <a:blip r:embed="rId2">
-            <a:extLst>
-              <a:ext uri="{28A0092B-C50C-407E-A947-70E740481C1C}">
-                <a14:useLocalDpi xmlns:a14="http://schemas.microsoft.com/office/drawing/2010/main" val="0"/>
-              </a:ext>
-            </a:extLst>
-          </a:blip>
-          <a:stretch>
-            <a:fillRect/>
-          </a:stretch>
-        </p:blipFill>
-        <p:spPr>
-          <a:xfrm>
-            <a:off x="7641336" y="6126162"/>
-            <a:ext cx="1465796" cy="706247"/>
-          </a:xfrm>
-          <a:prstGeom prst="rect">
-            <a:avLst/>
-          </a:prstGeom>
-        </p:spPr>
-      </p:pic>
     </p:spTree>
   </p:cSld>
   <p:clrMapOvr>
@@ -5585,7 +6321,7 @@
           <p:nvPr/>
         </p:nvPicPr>
         <p:blipFill rotWithShape="1">
-          <a:blip r:embed="rId1">
+          <a:blip r:embed="rId3">
             <a:alphaModFix amt="38000"/>
             <a:extLst>
               <a:ext uri="{28A0092B-C50C-407E-A947-70E740481C1C}">
@@ -5655,7 +6391,6 @@
               <a:rPr lang="en-US" dirty="0" smtClean="0"/>
               <a:t> </a:t>
             </a:r>
-            <a:endParaRPr lang="en-US" dirty="0" smtClean="0"/>
           </a:p>
           <a:p>
             <a:pPr>
@@ -5675,7 +6410,7 @@
           <p:nvPr/>
         </p:nvPicPr>
         <p:blipFill>
-          <a:blip r:embed="rId2">
+          <a:blip r:embed="rId4">
             <a:extLst>
               <a:ext uri="{28A0092B-C50C-407E-A947-70E740481C1C}">
                 <a14:useLocalDpi xmlns:a14="http://schemas.microsoft.com/office/drawing/2010/main" val="0"/>
@@ -5690,6 +6425,96 @@
           <a:xfrm>
             <a:off x="7641336" y="6126162"/>
             <a:ext cx="1465796" cy="706247"/>
+          </a:xfrm>
+          <a:prstGeom prst="rect">
+            <a:avLst/>
+          </a:prstGeom>
+        </p:spPr>
+      </p:pic>
+      <p:pic>
+        <p:nvPicPr>
+          <p:cNvPr id="11" name="Afbeelding 10"/>
+          <p:cNvPicPr>
+            <a:picLocks noChangeAspect="1"/>
+          </p:cNvPicPr>
+          <p:nvPr/>
+        </p:nvPicPr>
+        <p:blipFill>
+          <a:blip r:embed="rId5">
+            <a:extLst>
+              <a:ext uri="{28A0092B-C50C-407E-A947-70E740481C1C}">
+                <a14:useLocalDpi xmlns:a14="http://schemas.microsoft.com/office/drawing/2010/main" val="0"/>
+              </a:ext>
+            </a:extLst>
+          </a:blip>
+          <a:stretch>
+            <a:fillRect/>
+          </a:stretch>
+        </p:blipFill>
+        <p:spPr>
+          <a:xfrm>
+            <a:off x="2716732" y="3860121"/>
+            <a:ext cx="3916080" cy="2937061"/>
+          </a:xfrm>
+          <a:prstGeom prst="rect">
+            <a:avLst/>
+          </a:prstGeom>
+        </p:spPr>
+      </p:pic>
+      <p:pic>
+        <p:nvPicPr>
+          <p:cNvPr id="9" name="Afbeelding 8"/>
+          <p:cNvPicPr>
+            <a:picLocks noChangeAspect="1"/>
+          </p:cNvPicPr>
+          <p:nvPr/>
+        </p:nvPicPr>
+        <p:blipFill>
+          <a:blip r:embed="rId6">
+            <a:extLst>
+              <a:ext uri="{28A0092B-C50C-407E-A947-70E740481C1C}">
+                <a14:useLocalDpi xmlns:a14="http://schemas.microsoft.com/office/drawing/2010/main" val="0"/>
+              </a:ext>
+            </a:extLst>
+          </a:blip>
+          <a:stretch>
+            <a:fillRect/>
+          </a:stretch>
+        </p:blipFill>
+        <p:spPr>
+          <a:xfrm>
+            <a:off x="-392737" y="1137350"/>
+            <a:ext cx="4126774" cy="2958152"/>
+          </a:xfrm>
+          <a:prstGeom prst="rect">
+            <a:avLst/>
+          </a:prstGeom>
+        </p:spPr>
+      </p:pic>
+      <p:pic>
+        <p:nvPicPr>
+          <p:cNvPr id="10" name="Afbeelding 9"/>
+          <p:cNvPicPr>
+            <a:picLocks noChangeAspect="1"/>
+          </p:cNvPicPr>
+          <p:nvPr/>
+        </p:nvPicPr>
+        <p:blipFill>
+          <a:blip r:embed="rId7">
+            <a:extLst>
+              <a:ext uri="{28A0092B-C50C-407E-A947-70E740481C1C}">
+                <a14:useLocalDpi xmlns:a14="http://schemas.microsoft.com/office/drawing/2010/main" val="0"/>
+              </a:ext>
+            </a:extLst>
+          </a:blip>
+          <a:stretch>
+            <a:fillRect/>
+          </a:stretch>
+        </p:blipFill>
+        <p:spPr>
+          <a:xfrm>
+            <a:off x="5322627" y="1137350"/>
+            <a:ext cx="4031539" cy="2889558"/>
           </a:xfrm>
           <a:prstGeom prst="rect">
             <a:avLst/>
@@ -5737,7 +6562,7 @@
           <p:nvPr/>
         </p:nvPicPr>
         <p:blipFill rotWithShape="1">
-          <a:blip r:embed="rId1">
+          <a:blip r:embed="rId3">
             <a:alphaModFix amt="38000"/>
             <a:extLst>
               <a:ext uri="{28A0092B-C50C-407E-A947-70E740481C1C}">
@@ -5807,7 +6632,6 @@
               <a:rPr lang="en-US" dirty="0" smtClean="0"/>
               <a:t> </a:t>
             </a:r>
-            <a:endParaRPr lang="en-US" dirty="0" smtClean="0"/>
           </a:p>
           <a:p>
             <a:pPr>
@@ -5827,7 +6651,7 @@
           <p:nvPr/>
         </p:nvPicPr>
         <p:blipFill>
-          <a:blip r:embed="rId2">
+          <a:blip r:embed="rId4">
             <a:extLst>
               <a:ext uri="{28A0092B-C50C-407E-A947-70E740481C1C}">
                 <a14:useLocalDpi xmlns:a14="http://schemas.microsoft.com/office/drawing/2010/main" val="0"/>
@@ -5842,6 +6666,66 @@
           <a:xfrm>
             <a:off x="7641336" y="6126162"/>
             <a:ext cx="1465796" cy="706247"/>
+          </a:xfrm>
+          <a:prstGeom prst="rect">
+            <a:avLst/>
+          </a:prstGeom>
+        </p:spPr>
+      </p:pic>
+      <p:pic>
+        <p:nvPicPr>
+          <p:cNvPr id="5" name="Afbeelding 4"/>
+          <p:cNvPicPr>
+            <a:picLocks noChangeAspect="1"/>
+          </p:cNvPicPr>
+          <p:nvPr/>
+        </p:nvPicPr>
+        <p:blipFill>
+          <a:blip r:embed="rId5">
+            <a:extLst>
+              <a:ext uri="{28A0092B-C50C-407E-A947-70E740481C1C}">
+                <a14:useLocalDpi xmlns:a14="http://schemas.microsoft.com/office/drawing/2010/main" val="0"/>
+              </a:ext>
+            </a:extLst>
+          </a:blip>
+          <a:stretch>
+            <a:fillRect/>
+          </a:stretch>
+        </p:blipFill>
+        <p:spPr>
+          <a:xfrm>
+            <a:off x="0" y="1600200"/>
+            <a:ext cx="4713943" cy="3535457"/>
+          </a:xfrm>
+          <a:prstGeom prst="rect">
+            <a:avLst/>
+          </a:prstGeom>
+        </p:spPr>
+      </p:pic>
+      <p:pic>
+        <p:nvPicPr>
+          <p:cNvPr id="7" name="Afbeelding 6"/>
+          <p:cNvPicPr>
+            <a:picLocks noChangeAspect="1"/>
+          </p:cNvPicPr>
+          <p:nvPr/>
+        </p:nvPicPr>
+        <p:blipFill>
+          <a:blip r:embed="rId6">
+            <a:extLst>
+              <a:ext uri="{28A0092B-C50C-407E-A947-70E740481C1C}">
+                <a14:useLocalDpi xmlns:a14="http://schemas.microsoft.com/office/drawing/2010/main" val="0"/>
+              </a:ext>
+            </a:extLst>
+          </a:blip>
+          <a:stretch>
+            <a:fillRect/>
+          </a:stretch>
+        </p:blipFill>
+        <p:spPr>
+          <a:xfrm>
+            <a:off x="4517595" y="1600200"/>
+            <a:ext cx="4713942" cy="3535457"/>
           </a:xfrm>
           <a:prstGeom prst="rect">
             <a:avLst/>
@@ -6179,6 +7063,7 @@
       </a:style>
     </a:lnDef>
   </a:objectDefaults>
+  <a:extraClrSchemeLst/>
   <a:extLst>
     <a:ext uri="{05A4C25C-085E-4340-85A3-A5531E510DB2}">
       <thm15:themeFamily xmlns:thm15="http://schemas.microsoft.com/office/thememl/2012/main" name="Office Theme" id="{62F939B6-93AF-4DB8-9C6B-D6C7DFDC589F}" vid="{4A3C46E8-61CC-4603-A589-7422A47A8E4A}"/>
@@ -6438,6 +7323,8 @@
       </a:bgFillStyleLst>
     </a:fmtScheme>
   </a:themeElements>
+  <a:objectDefaults/>
+  <a:extraClrSchemeLst/>
   <a:extLst>
     <a:ext uri="{05A4C25C-085E-4340-85A3-A5531E510DB2}">
       <thm15:themeFamily xmlns:thm15="http://schemas.microsoft.com/office/thememl/2012/main" name="Office Theme" id="{62F939B6-93AF-4DB8-9C6B-D6C7DFDC589F}" vid="{4A3C46E8-61CC-4603-A589-7422A47A8E4A}"/>

</xml_diff>